<commit_message>
added SpectralWaveData_dummy header file in order to compile CFDwavemaker on windows without spectralwavedata library.
</commit_message>
<xml_diff>
--- a/docs/source/images/flowchart.pptx
+++ b/docs/source/images/flowchart.pptx
@@ -4,6 +4,9 @@
   <p:sldMasterIdLst>
     <p:sldMasterId id="2147483648" r:id="rId1"/>
   </p:sldMasterIdLst>
+  <p:notesMasterIdLst>
+    <p:notesMasterId r:id="rId3"/>
+  </p:notesMasterIdLst>
   <p:sldIdLst>
     <p:sldId id="256" r:id="rId2"/>
   </p:sldIdLst>
@@ -104,6 +107,11 @@
       </a:defRPr>
     </a:lvl9pPr>
   </p:defaultTextStyle>
+  <p:extLst>
+    <p:ext uri="{EFAFB233-063F-42B5-8137-9DF3F51BA10A}">
+      <p15:sldGuideLst xmlns:p15="http://schemas.microsoft.com/office/powerpoint/2012/main"/>
+    </p:ext>
+  </p:extLst>
 </p:presentation>
 </file>
 
@@ -879,10 +887,7 @@
             <a:rPr lang="en-GB" dirty="0" err="1"/>
             <a:t>CFDwavemaker</a:t>
           </a:r>
-          <a:r>
-            <a:rPr lang="en-GB" dirty="0"/>
-            <a:t> Theories</a:t>
-          </a:r>
+          <a:endParaRPr lang="en-GB" dirty="0"/>
         </a:p>
       </dgm:t>
     </dgm:pt>
@@ -984,7 +989,7 @@
       <dgm:prSet phldrT="[Text]"/>
       <dgm:spPr>
         <a:solidFill>
-          <a:srgbClr val="ED7D31"/>
+          <a:srgbClr val="4472C4"/>
         </a:solidFill>
       </dgm:spPr>
       <dgm:t>
@@ -1313,11 +1318,51 @@
         </a:p>
       </dgm:t>
     </dgm:pt>
-    <dgm:pt modelId="{105C466D-91D5-42DE-AE8C-D9D35221BBA3}">
+    <dgm:pt modelId="{570094B7-40B1-44FC-AD2A-FE02A27DBCAE}">
       <dgm:prSet phldrT="[Text]"/>
       <dgm:spPr>
         <a:solidFill>
-          <a:schemeClr val="accent2"/>
+          <a:srgbClr val="7030A0"/>
+        </a:solidFill>
+      </dgm:spPr>
+      <dgm:t>
+        <a:bodyPr/>
+        <a:lstStyle/>
+        <a:p>
+          <a:r>
+            <a:rPr lang="en-GB" dirty="0"/>
+            <a:t>HOSM</a:t>
+          </a:r>
+        </a:p>
+      </dgm:t>
+    </dgm:pt>
+    <dgm:pt modelId="{71106A1D-AAF9-4826-9FAB-A91F988378E5}" type="parTrans" cxnId="{930E5EB3-BEC7-406E-B5A7-EAB84AB890F3}">
+      <dgm:prSet/>
+      <dgm:spPr/>
+      <dgm:t>
+        <a:bodyPr/>
+        <a:lstStyle/>
+        <a:p>
+          <a:endParaRPr lang="en-GB"/>
+        </a:p>
+      </dgm:t>
+    </dgm:pt>
+    <dgm:pt modelId="{972C839F-339B-45DD-ABB9-DE62D48F8495}" type="sibTrans" cxnId="{930E5EB3-BEC7-406E-B5A7-EAB84AB890F3}">
+      <dgm:prSet/>
+      <dgm:spPr/>
+      <dgm:t>
+        <a:bodyPr/>
+        <a:lstStyle/>
+        <a:p>
+          <a:endParaRPr lang="en-GB"/>
+        </a:p>
+      </dgm:t>
+    </dgm:pt>
+    <dgm:pt modelId="{278DE225-3493-4F3E-A7DF-6FBB56A82786}">
+      <dgm:prSet phldrT="[Text]"/>
+      <dgm:spPr>
+        <a:solidFill>
+          <a:srgbClr val="7030A0"/>
         </a:solidFill>
       </dgm:spPr>
       <dgm:t>
@@ -1331,7 +1376,7 @@
         </a:p>
       </dgm:t>
     </dgm:pt>
-    <dgm:pt modelId="{C9F5BB99-D003-42FC-853E-3DDE6F45A0A6}" type="parTrans" cxnId="{BC7D2D77-BAD4-47BA-B233-30551130789B}">
+    <dgm:pt modelId="{422CAEF1-99A9-46BF-86BF-3C26C3033C5B}" type="parTrans" cxnId="{DCD9866D-32CC-4419-B520-8FEE9915C31A}">
       <dgm:prSet/>
       <dgm:spPr/>
       <dgm:t>
@@ -1342,7 +1387,47 @@
         </a:p>
       </dgm:t>
     </dgm:pt>
-    <dgm:pt modelId="{AD070162-1E93-4A0B-B513-EDC578DA8B27}" type="sibTrans" cxnId="{BC7D2D77-BAD4-47BA-B233-30551130789B}">
+    <dgm:pt modelId="{8E51F8B5-DEAC-4CC9-8CD9-FEAC9B703619}" type="sibTrans" cxnId="{DCD9866D-32CC-4419-B520-8FEE9915C31A}">
+      <dgm:prSet/>
+      <dgm:spPr/>
+      <dgm:t>
+        <a:bodyPr/>
+        <a:lstStyle/>
+        <a:p>
+          <a:endParaRPr lang="en-GB"/>
+        </a:p>
+      </dgm:t>
+    </dgm:pt>
+    <dgm:pt modelId="{043E8C1C-D81F-4234-B19B-47F3DE925189}">
+      <dgm:prSet phldrT="[Text]"/>
+      <dgm:spPr>
+        <a:solidFill>
+          <a:srgbClr val="7030A0"/>
+        </a:solidFill>
+      </dgm:spPr>
+      <dgm:t>
+        <a:bodyPr/>
+        <a:lstStyle/>
+        <a:p>
+          <a:r>
+            <a:rPr lang="en-GB" dirty="0"/>
+            <a:t>Fenton Stokes waves</a:t>
+          </a:r>
+        </a:p>
+      </dgm:t>
+    </dgm:pt>
+    <dgm:pt modelId="{AC2A9587-A7F9-4DCE-A8B5-58594956CAE2}" type="parTrans" cxnId="{44476900-F0F9-4D1F-843F-0D4C510699AD}">
+      <dgm:prSet/>
+      <dgm:spPr/>
+      <dgm:t>
+        <a:bodyPr/>
+        <a:lstStyle/>
+        <a:p>
+          <a:endParaRPr lang="en-GB"/>
+        </a:p>
+      </dgm:t>
+    </dgm:pt>
+    <dgm:pt modelId="{C09008D9-2CA1-4560-A096-1B1F5BE0A0C9}" type="sibTrans" cxnId="{44476900-F0F9-4D1F-843F-0D4C510699AD}">
       <dgm:prSet/>
       <dgm:spPr/>
       <dgm:t>
@@ -1427,7 +1512,7 @@
       <dgm:spPr/>
     </dgm:pt>
     <dgm:pt modelId="{DD71067A-5888-4803-BF54-2E22916BF19D}" type="pres">
-      <dgm:prSet presAssocID="{646E1BB7-65B7-4334-8B51-62AD68BD18A1}" presName="Name37" presStyleLbl="parChTrans1D3" presStyleIdx="0" presStyleCnt="7"/>
+      <dgm:prSet presAssocID="{646E1BB7-65B7-4334-8B51-62AD68BD18A1}" presName="Name37" presStyleLbl="parChTrans1D3" presStyleIdx="0" presStyleCnt="9"/>
       <dgm:spPr/>
     </dgm:pt>
     <dgm:pt modelId="{5B0BE2C8-F20C-4B38-86EC-9E76B508D8E9}" type="pres">
@@ -1443,7 +1528,7 @@
       <dgm:spPr/>
     </dgm:pt>
     <dgm:pt modelId="{42340B20-A7D0-4FC8-A51E-7EA7CB2EF7DB}" type="pres">
-      <dgm:prSet presAssocID="{35E91644-EF0A-4581-BC5C-C89D0B7FAE04}" presName="rootText" presStyleLbl="node3" presStyleIdx="0" presStyleCnt="7">
+      <dgm:prSet presAssocID="{35E91644-EF0A-4581-BC5C-C89D0B7FAE04}" presName="rootText" presStyleLbl="node3" presStyleIdx="0" presStyleCnt="9">
         <dgm:presLayoutVars>
           <dgm:chPref val="3"/>
         </dgm:presLayoutVars>
@@ -1451,7 +1536,7 @@
       <dgm:spPr/>
     </dgm:pt>
     <dgm:pt modelId="{51B04793-AD6B-4957-9AB0-A86AAC06914F}" type="pres">
-      <dgm:prSet presAssocID="{35E91644-EF0A-4581-BC5C-C89D0B7FAE04}" presName="rootConnector" presStyleLbl="node3" presStyleIdx="0" presStyleCnt="7"/>
+      <dgm:prSet presAssocID="{35E91644-EF0A-4581-BC5C-C89D0B7FAE04}" presName="rootConnector" presStyleLbl="node3" presStyleIdx="0" presStyleCnt="9"/>
       <dgm:spPr/>
     </dgm:pt>
     <dgm:pt modelId="{00AB9310-E95A-4111-9916-6650AA0CBD4F}" type="pres">
@@ -1463,7 +1548,7 @@
       <dgm:spPr/>
     </dgm:pt>
     <dgm:pt modelId="{C5CBCB4C-E4C2-44C6-8435-8B6B57113234}" type="pres">
-      <dgm:prSet presAssocID="{5C861C4E-165F-447C-9C81-03373EF846DC}" presName="Name37" presStyleLbl="parChTrans1D3" presStyleIdx="1" presStyleCnt="7"/>
+      <dgm:prSet presAssocID="{5C861C4E-165F-447C-9C81-03373EF846DC}" presName="Name37" presStyleLbl="parChTrans1D3" presStyleIdx="1" presStyleCnt="9"/>
       <dgm:spPr/>
     </dgm:pt>
     <dgm:pt modelId="{DEBF6793-6C64-40AE-A564-E2673F4D9A5A}" type="pres">
@@ -1479,7 +1564,7 @@
       <dgm:spPr/>
     </dgm:pt>
     <dgm:pt modelId="{CC591294-B2DE-47EE-B1A4-B88AC02F7A04}" type="pres">
-      <dgm:prSet presAssocID="{9C4794CE-51B6-4159-BDCC-9D4A004976E1}" presName="rootText" presStyleLbl="node3" presStyleIdx="1" presStyleCnt="7">
+      <dgm:prSet presAssocID="{9C4794CE-51B6-4159-BDCC-9D4A004976E1}" presName="rootText" presStyleLbl="node3" presStyleIdx="1" presStyleCnt="9">
         <dgm:presLayoutVars>
           <dgm:chPref val="3"/>
         </dgm:presLayoutVars>
@@ -1487,7 +1572,7 @@
       <dgm:spPr/>
     </dgm:pt>
     <dgm:pt modelId="{BA85FA53-1B0B-47FE-9293-9DE023FF288C}" type="pres">
-      <dgm:prSet presAssocID="{9C4794CE-51B6-4159-BDCC-9D4A004976E1}" presName="rootConnector" presStyleLbl="node3" presStyleIdx="1" presStyleCnt="7"/>
+      <dgm:prSet presAssocID="{9C4794CE-51B6-4159-BDCC-9D4A004976E1}" presName="rootConnector" presStyleLbl="node3" presStyleIdx="1" presStyleCnt="9"/>
       <dgm:spPr/>
     </dgm:pt>
     <dgm:pt modelId="{D713F554-C7A4-48BC-8F0C-179BC564EF06}" type="pres">
@@ -1535,7 +1620,7 @@
       <dgm:spPr/>
     </dgm:pt>
     <dgm:pt modelId="{7DF221ED-BE9E-4AC9-9FCC-3AE38A0F8C63}" type="pres">
-      <dgm:prSet presAssocID="{8DCBF402-7703-4973-B298-7121B98CE6BF}" presName="Name37" presStyleLbl="parChTrans1D3" presStyleIdx="2" presStyleCnt="7"/>
+      <dgm:prSet presAssocID="{8DCBF402-7703-4973-B298-7121B98CE6BF}" presName="Name37" presStyleLbl="parChTrans1D3" presStyleIdx="2" presStyleCnt="9"/>
       <dgm:spPr/>
     </dgm:pt>
     <dgm:pt modelId="{D4FBD3D9-7BCA-40CE-B9AA-26298606D36C}" type="pres">
@@ -1551,7 +1636,7 @@
       <dgm:spPr/>
     </dgm:pt>
     <dgm:pt modelId="{F791BBD2-5F40-4977-9408-107BBF8B04B0}" type="pres">
-      <dgm:prSet presAssocID="{C0766231-5411-48A4-AA1E-ED772CF65CC8}" presName="rootText" presStyleLbl="node3" presStyleIdx="2" presStyleCnt="7">
+      <dgm:prSet presAssocID="{C0766231-5411-48A4-AA1E-ED772CF65CC8}" presName="rootText" presStyleLbl="node3" presStyleIdx="2" presStyleCnt="9">
         <dgm:presLayoutVars>
           <dgm:chPref val="3"/>
         </dgm:presLayoutVars>
@@ -1559,7 +1644,7 @@
       <dgm:spPr/>
     </dgm:pt>
     <dgm:pt modelId="{F9009995-D160-43D1-A8D1-0539AC69A5D1}" type="pres">
-      <dgm:prSet presAssocID="{C0766231-5411-48A4-AA1E-ED772CF65CC8}" presName="rootConnector" presStyleLbl="node3" presStyleIdx="2" presStyleCnt="7"/>
+      <dgm:prSet presAssocID="{C0766231-5411-48A4-AA1E-ED772CF65CC8}" presName="rootConnector" presStyleLbl="node3" presStyleIdx="2" presStyleCnt="9"/>
       <dgm:spPr/>
     </dgm:pt>
     <dgm:pt modelId="{AF5A6D73-1179-4EFD-B24E-98DD0B34D133}" type="pres">
@@ -1568,42 +1653,6 @@
     </dgm:pt>
     <dgm:pt modelId="{2045EAD7-B430-44DA-AAB4-07511972BAA8}" type="pres">
       <dgm:prSet presAssocID="{C0766231-5411-48A4-AA1E-ED772CF65CC8}" presName="hierChild5" presStyleCnt="0"/>
-      <dgm:spPr/>
-    </dgm:pt>
-    <dgm:pt modelId="{59B99C9B-D27B-47B1-80A7-78A949EDE67F}" type="pres">
-      <dgm:prSet presAssocID="{C9F5BB99-D003-42FC-853E-3DDE6F45A0A6}" presName="Name37" presStyleLbl="parChTrans1D3" presStyleIdx="3" presStyleCnt="7"/>
-      <dgm:spPr/>
-    </dgm:pt>
-    <dgm:pt modelId="{3948DE96-680E-4257-904A-870EFE59AA50}" type="pres">
-      <dgm:prSet presAssocID="{105C466D-91D5-42DE-AE8C-D9D35221BBA3}" presName="hierRoot2" presStyleCnt="0">
-        <dgm:presLayoutVars>
-          <dgm:hierBranch val="init"/>
-        </dgm:presLayoutVars>
-      </dgm:prSet>
-      <dgm:spPr/>
-    </dgm:pt>
-    <dgm:pt modelId="{0F35D923-1488-4E3F-B946-009F7A670948}" type="pres">
-      <dgm:prSet presAssocID="{105C466D-91D5-42DE-AE8C-D9D35221BBA3}" presName="rootComposite" presStyleCnt="0"/>
-      <dgm:spPr/>
-    </dgm:pt>
-    <dgm:pt modelId="{C9CB80A4-660E-4814-91FA-BBF5877991B9}" type="pres">
-      <dgm:prSet presAssocID="{105C466D-91D5-42DE-AE8C-D9D35221BBA3}" presName="rootText" presStyleLbl="node3" presStyleIdx="3" presStyleCnt="7">
-        <dgm:presLayoutVars>
-          <dgm:chPref val="3"/>
-        </dgm:presLayoutVars>
-      </dgm:prSet>
-      <dgm:spPr/>
-    </dgm:pt>
-    <dgm:pt modelId="{85E37CE0-DE34-495F-BDC4-DCB82E8069EF}" type="pres">
-      <dgm:prSet presAssocID="{105C466D-91D5-42DE-AE8C-D9D35221BBA3}" presName="rootConnector" presStyleLbl="node3" presStyleIdx="3" presStyleCnt="7"/>
-      <dgm:spPr/>
-    </dgm:pt>
-    <dgm:pt modelId="{2480478D-BB42-40AE-8CB8-D7404D2945D5}" type="pres">
-      <dgm:prSet presAssocID="{105C466D-91D5-42DE-AE8C-D9D35221BBA3}" presName="hierChild4" presStyleCnt="0"/>
-      <dgm:spPr/>
-    </dgm:pt>
-    <dgm:pt modelId="{A051653B-2293-411C-A372-AF4A63DF0D3F}" type="pres">
-      <dgm:prSet presAssocID="{105C466D-91D5-42DE-AE8C-D9D35221BBA3}" presName="hierChild5" presStyleCnt="0"/>
       <dgm:spPr/>
     </dgm:pt>
     <dgm:pt modelId="{F1F652D4-9FCF-401B-A55F-C496AB09FA0E}" type="pres">
@@ -1643,7 +1692,7 @@
       <dgm:spPr/>
     </dgm:pt>
     <dgm:pt modelId="{8B30E3AB-DE3D-45F8-8B80-4EE2A406B3BE}" type="pres">
-      <dgm:prSet presAssocID="{DEDAACFA-C83D-4BB1-86F0-02B858A76182}" presName="Name37" presStyleLbl="parChTrans1D3" presStyleIdx="4" presStyleCnt="7"/>
+      <dgm:prSet presAssocID="{DEDAACFA-C83D-4BB1-86F0-02B858A76182}" presName="Name37" presStyleLbl="parChTrans1D3" presStyleIdx="3" presStyleCnt="9"/>
       <dgm:spPr/>
     </dgm:pt>
     <dgm:pt modelId="{46A7EE31-B2AA-4710-8635-54AEF773640D}" type="pres">
@@ -1659,7 +1708,7 @@
       <dgm:spPr/>
     </dgm:pt>
     <dgm:pt modelId="{9A589A47-6BA7-45D9-B671-86D7DC971640}" type="pres">
-      <dgm:prSet presAssocID="{2B9E4904-11CE-4AD2-95F1-AB0E66B75ECB}" presName="rootText" presStyleLbl="node3" presStyleIdx="4" presStyleCnt="7">
+      <dgm:prSet presAssocID="{2B9E4904-11CE-4AD2-95F1-AB0E66B75ECB}" presName="rootText" presStyleLbl="node3" presStyleIdx="3" presStyleCnt="9">
         <dgm:presLayoutVars>
           <dgm:chPref val="3"/>
         </dgm:presLayoutVars>
@@ -1667,7 +1716,7 @@
       <dgm:spPr/>
     </dgm:pt>
     <dgm:pt modelId="{468CC453-6D31-4B35-A150-D5DA30E2EE9C}" type="pres">
-      <dgm:prSet presAssocID="{2B9E4904-11CE-4AD2-95F1-AB0E66B75ECB}" presName="rootConnector" presStyleLbl="node3" presStyleIdx="4" presStyleCnt="7"/>
+      <dgm:prSet presAssocID="{2B9E4904-11CE-4AD2-95F1-AB0E66B75ECB}" presName="rootConnector" presStyleLbl="node3" presStyleIdx="3" presStyleCnt="9"/>
       <dgm:spPr/>
     </dgm:pt>
     <dgm:pt modelId="{8E925949-5F30-4593-9FD3-2B5B0B5EAF9F}" type="pres">
@@ -1679,7 +1728,7 @@
       <dgm:spPr/>
     </dgm:pt>
     <dgm:pt modelId="{D9778D18-16A6-4708-B8DD-1361D3F18661}" type="pres">
-      <dgm:prSet presAssocID="{EB83BCD3-8BF1-4765-B9A6-B5C5BAA36E4F}" presName="Name37" presStyleLbl="parChTrans1D3" presStyleIdx="5" presStyleCnt="7"/>
+      <dgm:prSet presAssocID="{EB83BCD3-8BF1-4765-B9A6-B5C5BAA36E4F}" presName="Name37" presStyleLbl="parChTrans1D3" presStyleIdx="4" presStyleCnt="9"/>
       <dgm:spPr/>
     </dgm:pt>
     <dgm:pt modelId="{A74773E6-257F-4EDB-9E46-F4FF64475C66}" type="pres">
@@ -1695,7 +1744,7 @@
       <dgm:spPr/>
     </dgm:pt>
     <dgm:pt modelId="{58BAD397-243E-44FF-9C17-403EE90D504D}" type="pres">
-      <dgm:prSet presAssocID="{96B375B1-AD21-49F6-8066-0FCBF3B72AC2}" presName="rootText" presStyleLbl="node3" presStyleIdx="5" presStyleCnt="7">
+      <dgm:prSet presAssocID="{96B375B1-AD21-49F6-8066-0FCBF3B72AC2}" presName="rootText" presStyleLbl="node3" presStyleIdx="4" presStyleCnt="9">
         <dgm:presLayoutVars>
           <dgm:chPref val="3"/>
         </dgm:presLayoutVars>
@@ -1703,7 +1752,7 @@
       <dgm:spPr/>
     </dgm:pt>
     <dgm:pt modelId="{B3332F55-9B7F-4FCE-B0DB-86F0864202EF}" type="pres">
-      <dgm:prSet presAssocID="{96B375B1-AD21-49F6-8066-0FCBF3B72AC2}" presName="rootConnector" presStyleLbl="node3" presStyleIdx="5" presStyleCnt="7"/>
+      <dgm:prSet presAssocID="{96B375B1-AD21-49F6-8066-0FCBF3B72AC2}" presName="rootConnector" presStyleLbl="node3" presStyleIdx="4" presStyleCnt="9"/>
       <dgm:spPr/>
     </dgm:pt>
     <dgm:pt modelId="{2BBAE570-C1FF-4ED7-936E-F1549AB9133A}" type="pres">
@@ -1715,7 +1764,7 @@
       <dgm:spPr/>
     </dgm:pt>
     <dgm:pt modelId="{8493A0AA-6D2C-4C90-BC9B-9A4B63AE580A}" type="pres">
-      <dgm:prSet presAssocID="{1F0473E4-D189-435D-A4A2-2ADC500B2D1A}" presName="Name37" presStyleLbl="parChTrans1D3" presStyleIdx="6" presStyleCnt="7"/>
+      <dgm:prSet presAssocID="{1F0473E4-D189-435D-A4A2-2ADC500B2D1A}" presName="Name37" presStyleLbl="parChTrans1D3" presStyleIdx="5" presStyleCnt="9"/>
       <dgm:spPr/>
     </dgm:pt>
     <dgm:pt modelId="{5B5E2286-EE47-4D78-8D49-FA59AF77DBC9}" type="pres">
@@ -1731,7 +1780,7 @@
       <dgm:spPr/>
     </dgm:pt>
     <dgm:pt modelId="{245CC1BC-660D-4C6F-835D-2F1729BC03D9}" type="pres">
-      <dgm:prSet presAssocID="{092547E1-06E2-40C4-B294-7D1491957E20}" presName="rootText" presStyleLbl="node3" presStyleIdx="6" presStyleCnt="7">
+      <dgm:prSet presAssocID="{092547E1-06E2-40C4-B294-7D1491957E20}" presName="rootText" presStyleLbl="node3" presStyleIdx="5" presStyleCnt="9">
         <dgm:presLayoutVars>
           <dgm:chPref val="3"/>
         </dgm:presLayoutVars>
@@ -1739,7 +1788,7 @@
       <dgm:spPr/>
     </dgm:pt>
     <dgm:pt modelId="{35312DD1-B0D5-4203-AC74-8E34EE302603}" type="pres">
-      <dgm:prSet presAssocID="{092547E1-06E2-40C4-B294-7D1491957E20}" presName="rootConnector" presStyleLbl="node3" presStyleIdx="6" presStyleCnt="7"/>
+      <dgm:prSet presAssocID="{092547E1-06E2-40C4-B294-7D1491957E20}" presName="rootConnector" presStyleLbl="node3" presStyleIdx="5" presStyleCnt="9"/>
       <dgm:spPr/>
     </dgm:pt>
     <dgm:pt modelId="{9E962CFD-5B68-4653-9447-DFFF4175EFB0}" type="pres">
@@ -1786,6 +1835,114 @@
       <dgm:prSet presAssocID="{0FED4B24-979E-47FB-B1BA-C1585230BE1C}" presName="hierChild4" presStyleCnt="0"/>
       <dgm:spPr/>
     </dgm:pt>
+    <dgm:pt modelId="{0C261963-7CC4-4EBC-869B-EE1C8353F0F6}" type="pres">
+      <dgm:prSet presAssocID="{71106A1D-AAF9-4826-9FAB-A91F988378E5}" presName="Name37" presStyleLbl="parChTrans1D3" presStyleIdx="6" presStyleCnt="9"/>
+      <dgm:spPr/>
+    </dgm:pt>
+    <dgm:pt modelId="{FF3F2318-C8D0-44A9-8B0B-7DBB262B704D}" type="pres">
+      <dgm:prSet presAssocID="{570094B7-40B1-44FC-AD2A-FE02A27DBCAE}" presName="hierRoot2" presStyleCnt="0">
+        <dgm:presLayoutVars>
+          <dgm:hierBranch val="init"/>
+        </dgm:presLayoutVars>
+      </dgm:prSet>
+      <dgm:spPr/>
+    </dgm:pt>
+    <dgm:pt modelId="{6EA2020D-69E9-4B44-8876-B840E84E3364}" type="pres">
+      <dgm:prSet presAssocID="{570094B7-40B1-44FC-AD2A-FE02A27DBCAE}" presName="rootComposite" presStyleCnt="0"/>
+      <dgm:spPr/>
+    </dgm:pt>
+    <dgm:pt modelId="{21C75DC7-95DB-40C4-A80C-F41228540CC4}" type="pres">
+      <dgm:prSet presAssocID="{570094B7-40B1-44FC-AD2A-FE02A27DBCAE}" presName="rootText" presStyleLbl="node3" presStyleIdx="6" presStyleCnt="9">
+        <dgm:presLayoutVars>
+          <dgm:chPref val="3"/>
+        </dgm:presLayoutVars>
+      </dgm:prSet>
+      <dgm:spPr/>
+    </dgm:pt>
+    <dgm:pt modelId="{BF5CB8FF-1810-48C4-AAAB-7B2767B6BD71}" type="pres">
+      <dgm:prSet presAssocID="{570094B7-40B1-44FC-AD2A-FE02A27DBCAE}" presName="rootConnector" presStyleLbl="node3" presStyleIdx="6" presStyleCnt="9"/>
+      <dgm:spPr/>
+    </dgm:pt>
+    <dgm:pt modelId="{F2D3BDA8-8F8F-492E-8928-531DF9F331AD}" type="pres">
+      <dgm:prSet presAssocID="{570094B7-40B1-44FC-AD2A-FE02A27DBCAE}" presName="hierChild4" presStyleCnt="0"/>
+      <dgm:spPr/>
+    </dgm:pt>
+    <dgm:pt modelId="{B00C4F8A-8E6A-4304-B42A-F317E76E8974}" type="pres">
+      <dgm:prSet presAssocID="{570094B7-40B1-44FC-AD2A-FE02A27DBCAE}" presName="hierChild5" presStyleCnt="0"/>
+      <dgm:spPr/>
+    </dgm:pt>
+    <dgm:pt modelId="{48117D59-1497-42A3-B3B3-F638950FAA64}" type="pres">
+      <dgm:prSet presAssocID="{422CAEF1-99A9-46BF-86BF-3C26C3033C5B}" presName="Name37" presStyleLbl="parChTrans1D3" presStyleIdx="7" presStyleCnt="9"/>
+      <dgm:spPr/>
+    </dgm:pt>
+    <dgm:pt modelId="{E81E97CE-B58E-4C24-BA81-31F6E915D788}" type="pres">
+      <dgm:prSet presAssocID="{278DE225-3493-4F3E-A7DF-6FBB56A82786}" presName="hierRoot2" presStyleCnt="0">
+        <dgm:presLayoutVars>
+          <dgm:hierBranch val="init"/>
+        </dgm:presLayoutVars>
+      </dgm:prSet>
+      <dgm:spPr/>
+    </dgm:pt>
+    <dgm:pt modelId="{BA480DAA-0B66-4D3A-8AD0-78C693D6A7D1}" type="pres">
+      <dgm:prSet presAssocID="{278DE225-3493-4F3E-A7DF-6FBB56A82786}" presName="rootComposite" presStyleCnt="0"/>
+      <dgm:spPr/>
+    </dgm:pt>
+    <dgm:pt modelId="{BA54416D-B103-4182-8BA9-63C3B851EDB8}" type="pres">
+      <dgm:prSet presAssocID="{278DE225-3493-4F3E-A7DF-6FBB56A82786}" presName="rootText" presStyleLbl="node3" presStyleIdx="7" presStyleCnt="9">
+        <dgm:presLayoutVars>
+          <dgm:chPref val="3"/>
+        </dgm:presLayoutVars>
+      </dgm:prSet>
+      <dgm:spPr/>
+    </dgm:pt>
+    <dgm:pt modelId="{16936C3E-7CD0-455A-BBC0-F46908AE22F9}" type="pres">
+      <dgm:prSet presAssocID="{278DE225-3493-4F3E-A7DF-6FBB56A82786}" presName="rootConnector" presStyleLbl="node3" presStyleIdx="7" presStyleCnt="9"/>
+      <dgm:spPr/>
+    </dgm:pt>
+    <dgm:pt modelId="{778F53D5-C7CA-4111-ADF1-469D5FF62A9F}" type="pres">
+      <dgm:prSet presAssocID="{278DE225-3493-4F3E-A7DF-6FBB56A82786}" presName="hierChild4" presStyleCnt="0"/>
+      <dgm:spPr/>
+    </dgm:pt>
+    <dgm:pt modelId="{E3831ECD-4F19-4DA5-AB87-5F13E860BFB4}" type="pres">
+      <dgm:prSet presAssocID="{278DE225-3493-4F3E-A7DF-6FBB56A82786}" presName="hierChild5" presStyleCnt="0"/>
+      <dgm:spPr/>
+    </dgm:pt>
+    <dgm:pt modelId="{AD8BCDFE-3794-4439-87E7-7B650A2CCEBF}" type="pres">
+      <dgm:prSet presAssocID="{AC2A9587-A7F9-4DCE-A8B5-58594956CAE2}" presName="Name37" presStyleLbl="parChTrans1D3" presStyleIdx="8" presStyleCnt="9"/>
+      <dgm:spPr/>
+    </dgm:pt>
+    <dgm:pt modelId="{BEAE0C38-2D53-4303-96AE-102EC0B89327}" type="pres">
+      <dgm:prSet presAssocID="{043E8C1C-D81F-4234-B19B-47F3DE925189}" presName="hierRoot2" presStyleCnt="0">
+        <dgm:presLayoutVars>
+          <dgm:hierBranch val="init"/>
+        </dgm:presLayoutVars>
+      </dgm:prSet>
+      <dgm:spPr/>
+    </dgm:pt>
+    <dgm:pt modelId="{7FF6081E-60CF-4632-AB79-49DE599C75F0}" type="pres">
+      <dgm:prSet presAssocID="{043E8C1C-D81F-4234-B19B-47F3DE925189}" presName="rootComposite" presStyleCnt="0"/>
+      <dgm:spPr/>
+    </dgm:pt>
+    <dgm:pt modelId="{6FF7F16C-89F2-4EFB-9949-06592EABB9E1}" type="pres">
+      <dgm:prSet presAssocID="{043E8C1C-D81F-4234-B19B-47F3DE925189}" presName="rootText" presStyleLbl="node3" presStyleIdx="8" presStyleCnt="9">
+        <dgm:presLayoutVars>
+          <dgm:chPref val="3"/>
+        </dgm:presLayoutVars>
+      </dgm:prSet>
+      <dgm:spPr/>
+    </dgm:pt>
+    <dgm:pt modelId="{EC84D945-7997-4681-A754-52D6E71BF8C7}" type="pres">
+      <dgm:prSet presAssocID="{043E8C1C-D81F-4234-B19B-47F3DE925189}" presName="rootConnector" presStyleLbl="node3" presStyleIdx="8" presStyleCnt="9"/>
+      <dgm:spPr/>
+    </dgm:pt>
+    <dgm:pt modelId="{7BC8D9A3-C7AA-472B-8E21-3390F7BE8D23}" type="pres">
+      <dgm:prSet presAssocID="{043E8C1C-D81F-4234-B19B-47F3DE925189}" presName="hierChild4" presStyleCnt="0"/>
+      <dgm:spPr/>
+    </dgm:pt>
+    <dgm:pt modelId="{AB77898D-B279-4F4E-8316-CFC98616B37A}" type="pres">
+      <dgm:prSet presAssocID="{043E8C1C-D81F-4234-B19B-47F3DE925189}" presName="hierChild5" presStyleCnt="0"/>
+      <dgm:spPr/>
+    </dgm:pt>
     <dgm:pt modelId="{EEA40560-6550-450F-A876-833A019237D2}" type="pres">
       <dgm:prSet presAssocID="{0FED4B24-979E-47FB-B1BA-C1585230BE1C}" presName="hierChild5" presStyleCnt="0"/>
       <dgm:spPr/>
@@ -1796,24 +1953,27 @@
     </dgm:pt>
   </dgm:ptLst>
   <dgm:cxnLst>
+    <dgm:cxn modelId="{44476900-F0F9-4D1F-843F-0D4C510699AD}" srcId="{0FED4B24-979E-47FB-B1BA-C1585230BE1C}" destId="{043E8C1C-D81F-4234-B19B-47F3DE925189}" srcOrd="2" destOrd="0" parTransId="{AC2A9587-A7F9-4DCE-A8B5-58594956CAE2}" sibTransId="{C09008D9-2CA1-4560-A096-1B1F5BE0A0C9}"/>
     <dgm:cxn modelId="{F1322904-36E6-463A-8AFE-BE0754777456}" srcId="{7AEFF893-4FCC-460A-83FB-CE255B9B2043}" destId="{9C4794CE-51B6-4159-BDCC-9D4A004976E1}" srcOrd="1" destOrd="0" parTransId="{5C861C4E-165F-447C-9C81-03373EF846DC}" sibTransId="{1F56F847-A9CC-4A0F-B07B-96406D37FC21}"/>
     <dgm:cxn modelId="{5F8A9A06-A684-4346-8F24-58394BE955AD}" type="presOf" srcId="{9C4794CE-51B6-4159-BDCC-9D4A004976E1}" destId="{CC591294-B2DE-47EE-B1A4-B88AC02F7A04}" srcOrd="0" destOrd="0" presId="urn:microsoft.com/office/officeart/2005/8/layout/orgChart1"/>
     <dgm:cxn modelId="{1CB52D0A-3B64-49DF-B593-C68E416934DB}" type="presOf" srcId="{35E91644-EF0A-4581-BC5C-C89D0B7FAE04}" destId="{51B04793-AD6B-4957-9AB0-A86AAC06914F}" srcOrd="1" destOrd="0" presId="urn:microsoft.com/office/officeart/2005/8/layout/orgChart1"/>
+    <dgm:cxn modelId="{5414A60E-B865-4C47-86B0-B32EDE49457C}" type="presOf" srcId="{AC2A9587-A7F9-4DCE-A8B5-58594956CAE2}" destId="{AD8BCDFE-3794-4439-87E7-7B650A2CCEBF}" srcOrd="0" destOrd="0" presId="urn:microsoft.com/office/officeart/2005/8/layout/orgChart1"/>
     <dgm:cxn modelId="{492D0A16-9096-45C4-8A10-C5DBCF67BA40}" type="presOf" srcId="{D2912E80-3E7C-4ECB-B5E9-436C42FCB40A}" destId="{6129412F-3C30-46DC-8AB6-706D3CF0EE0D}" srcOrd="1" destOrd="0" presId="urn:microsoft.com/office/officeart/2005/8/layout/orgChart1"/>
     <dgm:cxn modelId="{6B6D0018-25E0-4F86-A1E9-BBCFE6E23AB2}" type="presOf" srcId="{BD12C476-25A8-4D58-868A-B592333E305D}" destId="{BC548B41-56EE-44B3-80AB-819FD2C18A07}" srcOrd="0" destOrd="0" presId="urn:microsoft.com/office/officeart/2005/8/layout/orgChart1"/>
+    <dgm:cxn modelId="{DB29B120-1B75-4E87-BE59-02B8DA263DEE}" type="presOf" srcId="{043E8C1C-D81F-4234-B19B-47F3DE925189}" destId="{6FF7F16C-89F2-4EFB-9949-06592EABB9E1}" srcOrd="0" destOrd="0" presId="urn:microsoft.com/office/officeart/2005/8/layout/orgChart1"/>
     <dgm:cxn modelId="{0E2D4321-434A-4502-A429-9A0985123AFF}" type="presOf" srcId="{DEDAACFA-C83D-4BB1-86F0-02B858A76182}" destId="{8B30E3AB-DE3D-45F8-8B80-4EE2A406B3BE}" srcOrd="0" destOrd="0" presId="urn:microsoft.com/office/officeart/2005/8/layout/orgChart1"/>
     <dgm:cxn modelId="{F7ED9923-6A0F-4AE1-8091-88B068B5A670}" type="presOf" srcId="{092547E1-06E2-40C4-B294-7D1491957E20}" destId="{35312DD1-B0D5-4203-AC74-8E34EE302603}" srcOrd="1" destOrd="0" presId="urn:microsoft.com/office/officeart/2005/8/layout/orgChart1"/>
     <dgm:cxn modelId="{4376AA23-5A74-4E4D-9F82-0331E65BB431}" srcId="{BD12C476-25A8-4D58-868A-B592333E305D}" destId="{0FED4B24-979E-47FB-B1BA-C1585230BE1C}" srcOrd="3" destOrd="0" parTransId="{A17F5DE3-B57C-49CE-8C9D-0630A12A418A}" sibTransId="{E3A81EFC-639F-4815-8A48-06479EA3C060}"/>
+    <dgm:cxn modelId="{8AE7F930-BA3D-43FF-ABA0-34F0B9E1012C}" type="presOf" srcId="{043E8C1C-D81F-4234-B19B-47F3DE925189}" destId="{EC84D945-7997-4681-A754-52D6E71BF8C7}" srcOrd="1" destOrd="0" presId="urn:microsoft.com/office/officeart/2005/8/layout/orgChart1"/>
     <dgm:cxn modelId="{8766A931-D65E-488C-A568-D4EB2D413351}" type="presOf" srcId="{7AEFF893-4FCC-460A-83FB-CE255B9B2043}" destId="{802E448B-0DE8-46D5-B998-019F8335A5EB}" srcOrd="0" destOrd="0" presId="urn:microsoft.com/office/officeart/2005/8/layout/orgChart1"/>
     <dgm:cxn modelId="{69482C3F-FE5F-492D-AA5B-FFD6D838FE7E}" type="presOf" srcId="{91D3485F-A498-48A9-9086-3F6D6E1C79C2}" destId="{AFB997C3-FCEF-49D2-83C8-5CE0E804688D}" srcOrd="0" destOrd="0" presId="urn:microsoft.com/office/officeart/2005/8/layout/orgChart1"/>
     <dgm:cxn modelId="{C46D085F-C8FB-463A-95FC-8A35C4CAE5F2}" type="presOf" srcId="{57B7F03F-858F-459B-9A8D-6208223726CE}" destId="{B3C8EB9A-5D58-4F6D-926D-849CFA6C3BBE}" srcOrd="0" destOrd="0" presId="urn:microsoft.com/office/officeart/2005/8/layout/orgChart1"/>
     <dgm:cxn modelId="{A3BD7860-486C-4BAC-8663-8D5444F07D95}" type="presOf" srcId="{0FED4B24-979E-47FB-B1BA-C1585230BE1C}" destId="{0D44A240-59CA-48BB-B01D-A37DD223F8E3}" srcOrd="1" destOrd="0" presId="urn:microsoft.com/office/officeart/2005/8/layout/orgChart1"/>
     <dgm:cxn modelId="{50F7F347-863A-487D-8754-7953A58244D4}" type="presOf" srcId="{EB83BCD3-8BF1-4765-B9A6-B5C5BAA36E4F}" destId="{D9778D18-16A6-4708-B8DD-1361D3F18661}" srcOrd="0" destOrd="0" presId="urn:microsoft.com/office/officeart/2005/8/layout/orgChart1"/>
+    <dgm:cxn modelId="{DCD9866D-32CC-4419-B520-8FEE9915C31A}" srcId="{0FED4B24-979E-47FB-B1BA-C1585230BE1C}" destId="{278DE225-3493-4F3E-A7DF-6FBB56A82786}" srcOrd="1" destOrd="0" parTransId="{422CAEF1-99A9-46BF-86BF-3C26C3033C5B}" sibTransId="{8E51F8B5-DEAC-4CC9-8CD9-FEAC9B703619}"/>
     <dgm:cxn modelId="{BC5C1C6F-DF07-4560-9E5E-A131381727C0}" srcId="{C08F83C5-8E5E-404B-A5FF-373EBB389374}" destId="{BD12C476-25A8-4D58-868A-B592333E305D}" srcOrd="0" destOrd="0" parTransId="{81D1C6C6-8C9B-426B-B6AE-6FA2AD9D0E9E}" sibTransId="{2222A103-B796-48D5-B2CA-555299E720F6}"/>
-    <dgm:cxn modelId="{81F19271-D763-404A-A561-9EDC3F966BF5}" type="presOf" srcId="{105C466D-91D5-42DE-AE8C-D9D35221BBA3}" destId="{85E37CE0-DE34-495F-BDC4-DCB82E8069EF}" srcOrd="1" destOrd="0" presId="urn:microsoft.com/office/officeart/2005/8/layout/orgChart1"/>
     <dgm:cxn modelId="{CFBE8872-AC40-40AB-A1F2-3B1A0953F2E0}" type="presOf" srcId="{8DCBF402-7703-4973-B298-7121B98CE6BF}" destId="{7DF221ED-BE9E-4AC9-9FCC-3AE38A0F8C63}" srcOrd="0" destOrd="0" presId="urn:microsoft.com/office/officeart/2005/8/layout/orgChart1"/>
     <dgm:cxn modelId="{6C15B474-828E-4BA7-9B88-47F7D6DF73FA}" type="presOf" srcId="{BD12C476-25A8-4D58-868A-B592333E305D}" destId="{15998677-22C0-441E-B7E4-74B518B8F823}" srcOrd="1" destOrd="0" presId="urn:microsoft.com/office/officeart/2005/8/layout/orgChart1"/>
-    <dgm:cxn modelId="{BC7D2D77-BAD4-47BA-B233-30551130789B}" srcId="{0D5EC697-E2FE-4DD4-8080-A70A6964918B}" destId="{105C466D-91D5-42DE-AE8C-D9D35221BBA3}" srcOrd="1" destOrd="0" parTransId="{C9F5BB99-D003-42FC-853E-3DDE6F45A0A6}" sibTransId="{AD070162-1E93-4A0B-B513-EDC578DA8B27}"/>
     <dgm:cxn modelId="{9DC5D37B-B9D8-4904-9B05-803D17910E54}" srcId="{0D5EC697-E2FE-4DD4-8080-A70A6964918B}" destId="{C0766231-5411-48A4-AA1E-ED772CF65CC8}" srcOrd="0" destOrd="0" parTransId="{8DCBF402-7703-4973-B298-7121B98CE6BF}" sibTransId="{E1CC4440-225F-4260-8D42-FCBC298332A2}"/>
     <dgm:cxn modelId="{AD05E07B-A822-40C0-9609-384047E8E0F3}" type="presOf" srcId="{C08F83C5-8E5E-404B-A5FF-373EBB389374}" destId="{A226B3B5-9D20-4A23-9160-235FC3E9A9A4}" srcOrd="0" destOrd="0" presId="urn:microsoft.com/office/officeart/2005/8/layout/orgChart1"/>
     <dgm:cxn modelId="{5C9CB77C-5967-424C-A3A4-5E031365E5B2}" type="presOf" srcId="{9C4794CE-51B6-4159-BDCC-9D4A004976E1}" destId="{BA85FA53-1B0B-47FE-9293-9DE023FF288C}" srcOrd="1" destOrd="0" presId="urn:microsoft.com/office/officeart/2005/8/layout/orgChart1"/>
@@ -1822,26 +1982,31 @@
     <dgm:cxn modelId="{5D9F5683-1F16-484F-8B04-BADDBA4BB5E1}" type="presOf" srcId="{2B9E4904-11CE-4AD2-95F1-AB0E66B75ECB}" destId="{468CC453-6D31-4B35-A150-D5DA30E2EE9C}" srcOrd="1" destOrd="0" presId="urn:microsoft.com/office/officeart/2005/8/layout/orgChart1"/>
     <dgm:cxn modelId="{FC174085-401D-49D6-8D2A-C037221D9687}" srcId="{BD12C476-25A8-4D58-868A-B592333E305D}" destId="{D2912E80-3E7C-4ECB-B5E9-436C42FCB40A}" srcOrd="2" destOrd="0" parTransId="{ACC46A10-07B2-4540-9DAA-7D2E88B0E0F5}" sibTransId="{8853C8AE-0445-43C3-9B11-74F92F3EEE63}"/>
     <dgm:cxn modelId="{30A79486-0C50-4764-8582-D418C6F8BAAC}" srcId="{BD12C476-25A8-4D58-868A-B592333E305D}" destId="{0D5EC697-E2FE-4DD4-8080-A70A6964918B}" srcOrd="1" destOrd="0" parTransId="{57B7F03F-858F-459B-9A8D-6208223726CE}" sibTransId="{26D41AC7-1A88-4917-9118-1B5D279F8BD2}"/>
-    <dgm:cxn modelId="{0CCDA190-8FFB-4FE9-B4BF-F1EBFD52ACDF}" type="presOf" srcId="{105C466D-91D5-42DE-AE8C-D9D35221BBA3}" destId="{C9CB80A4-660E-4814-91FA-BBF5877991B9}" srcOrd="0" destOrd="0" presId="urn:microsoft.com/office/officeart/2005/8/layout/orgChart1"/>
+    <dgm:cxn modelId="{44B73287-E452-4027-8750-B63B3E81C939}" type="presOf" srcId="{570094B7-40B1-44FC-AD2A-FE02A27DBCAE}" destId="{BF5CB8FF-1810-48C4-AAAB-7B2767B6BD71}" srcOrd="1" destOrd="0" presId="urn:microsoft.com/office/officeart/2005/8/layout/orgChart1"/>
+    <dgm:cxn modelId="{DCFEF799-3B44-41EE-A780-E47DC1E396DA}" type="presOf" srcId="{71106A1D-AAF9-4826-9FAB-A91F988378E5}" destId="{0C261963-7CC4-4EBC-869B-EE1C8353F0F6}" srcOrd="0" destOrd="0" presId="urn:microsoft.com/office/officeart/2005/8/layout/orgChart1"/>
     <dgm:cxn modelId="{6E59709E-F19A-4585-A96B-8E5CB585C67C}" srcId="{D2912E80-3E7C-4ECB-B5E9-436C42FCB40A}" destId="{2B9E4904-11CE-4AD2-95F1-AB0E66B75ECB}" srcOrd="0" destOrd="0" parTransId="{DEDAACFA-C83D-4BB1-86F0-02B858A76182}" sibTransId="{C4333AF0-DC2C-43D5-8055-3C114C963885}"/>
     <dgm:cxn modelId="{3798CAA2-3905-4786-B3FC-769C9C5F30A6}" type="presOf" srcId="{092547E1-06E2-40C4-B294-7D1491957E20}" destId="{245CC1BC-660D-4C6F-835D-2F1729BC03D9}" srcOrd="0" destOrd="0" presId="urn:microsoft.com/office/officeart/2005/8/layout/orgChart1"/>
+    <dgm:cxn modelId="{75E058A5-7B71-48D3-B877-20FC05774176}" type="presOf" srcId="{278DE225-3493-4F3E-A7DF-6FBB56A82786}" destId="{16936C3E-7CD0-455A-BBC0-F46908AE22F9}" srcOrd="1" destOrd="0" presId="urn:microsoft.com/office/officeart/2005/8/layout/orgChart1"/>
     <dgm:cxn modelId="{73E0BEA8-4B78-4F3B-BB94-A86412973974}" type="presOf" srcId="{D2912E80-3E7C-4ECB-B5E9-436C42FCB40A}" destId="{563B6DE1-A704-4536-9984-341CEC7603C2}" srcOrd="0" destOrd="0" presId="urn:microsoft.com/office/officeart/2005/8/layout/orgChart1"/>
     <dgm:cxn modelId="{256130AB-C22A-4A0F-935E-B1B29CA799AB}" type="presOf" srcId="{96B375B1-AD21-49F6-8066-0FCBF3B72AC2}" destId="{58BAD397-243E-44FF-9C17-403EE90D504D}" srcOrd="0" destOrd="0" presId="urn:microsoft.com/office/officeart/2005/8/layout/orgChart1"/>
     <dgm:cxn modelId="{2FC84FAF-FE8D-4EB1-842B-BB250EF65194}" type="presOf" srcId="{A17F5DE3-B57C-49CE-8C9D-0630A12A418A}" destId="{14BC8A60-44FF-45BF-A86A-F7194A98A442}" srcOrd="0" destOrd="0" presId="urn:microsoft.com/office/officeart/2005/8/layout/orgChart1"/>
     <dgm:cxn modelId="{836EC7B0-B2C0-4F3B-9446-2357B842C3FD}" type="presOf" srcId="{7AEFF893-4FCC-460A-83FB-CE255B9B2043}" destId="{BD344A61-B2B6-4A0A-814B-747288ECFE51}" srcOrd="1" destOrd="0" presId="urn:microsoft.com/office/officeart/2005/8/layout/orgChart1"/>
     <dgm:cxn modelId="{D83CDFB1-1BC7-4153-88AF-1FF987AC9B61}" type="presOf" srcId="{C0766231-5411-48A4-AA1E-ED772CF65CC8}" destId="{F791BBD2-5F40-4977-9408-107BBF8B04B0}" srcOrd="0" destOrd="0" presId="urn:microsoft.com/office/officeart/2005/8/layout/orgChart1"/>
+    <dgm:cxn modelId="{930E5EB3-BEC7-406E-B5A7-EAB84AB890F3}" srcId="{0FED4B24-979E-47FB-B1BA-C1585230BE1C}" destId="{570094B7-40B1-44FC-AD2A-FE02A27DBCAE}" srcOrd="0" destOrd="0" parTransId="{71106A1D-AAF9-4826-9FAB-A91F988378E5}" sibTransId="{972C839F-339B-45DD-ABB9-DE62D48F8495}"/>
     <dgm:cxn modelId="{A5F0FDB3-4C0A-41B1-9D65-7793F01B5EB2}" srcId="{D2912E80-3E7C-4ECB-B5E9-436C42FCB40A}" destId="{96B375B1-AD21-49F6-8066-0FCBF3B72AC2}" srcOrd="1" destOrd="0" parTransId="{EB83BCD3-8BF1-4765-B9A6-B5C5BAA36E4F}" sibTransId="{32D2ADDF-992E-4766-AA11-8A6757018E26}"/>
+    <dgm:cxn modelId="{35C5E1BF-090A-4E37-87B9-AED5A37BCEC9}" type="presOf" srcId="{422CAEF1-99A9-46BF-86BF-3C26C3033C5B}" destId="{48117D59-1497-42A3-B3B3-F638950FAA64}" srcOrd="0" destOrd="0" presId="urn:microsoft.com/office/officeart/2005/8/layout/orgChart1"/>
     <dgm:cxn modelId="{104D3AC5-C15D-435A-8D29-D3D4C293DD6D}" type="presOf" srcId="{1F0473E4-D189-435D-A4A2-2ADC500B2D1A}" destId="{8493A0AA-6D2C-4C90-BC9B-9A4B63AE580A}" srcOrd="0" destOrd="0" presId="urn:microsoft.com/office/officeart/2005/8/layout/orgChart1"/>
     <dgm:cxn modelId="{CF46A8C5-C456-4CC6-B721-B5BC33B1FE5C}" type="presOf" srcId="{0D5EC697-E2FE-4DD4-8080-A70A6964918B}" destId="{0DD4B453-DC09-427C-9FE3-2C7357288C28}" srcOrd="0" destOrd="0" presId="urn:microsoft.com/office/officeart/2005/8/layout/orgChart1"/>
+    <dgm:cxn modelId="{A76EDBC7-8790-4D3F-AD25-232B5FC174D9}" type="presOf" srcId="{278DE225-3493-4F3E-A7DF-6FBB56A82786}" destId="{BA54416D-B103-4182-8BA9-63C3B851EDB8}" srcOrd="0" destOrd="0" presId="urn:microsoft.com/office/officeart/2005/8/layout/orgChart1"/>
     <dgm:cxn modelId="{933FB8CB-05C2-440A-89A6-66F28F1E1B7C}" type="presOf" srcId="{0D5EC697-E2FE-4DD4-8080-A70A6964918B}" destId="{C41D237E-54C5-4819-9624-6FCB27A7D8C2}" srcOrd="1" destOrd="0" presId="urn:microsoft.com/office/officeart/2005/8/layout/orgChart1"/>
     <dgm:cxn modelId="{F67A7BD1-B84E-4FDA-BBA8-D3743CAA93AF}" srcId="{BD12C476-25A8-4D58-868A-B592333E305D}" destId="{7AEFF893-4FCC-460A-83FB-CE255B9B2043}" srcOrd="0" destOrd="0" parTransId="{91D3485F-A498-48A9-9086-3F6D6E1C79C2}" sibTransId="{6FD507B7-6BC8-41BD-A536-F227F692DF68}"/>
     <dgm:cxn modelId="{4C3E47D8-618F-49DD-9D25-2791B32C0C82}" type="presOf" srcId="{C0766231-5411-48A4-AA1E-ED772CF65CC8}" destId="{F9009995-D160-43D1-A8D1-0539AC69A5D1}" srcOrd="1" destOrd="0" presId="urn:microsoft.com/office/officeart/2005/8/layout/orgChart1"/>
     <dgm:cxn modelId="{BCAAF0D9-5B91-450A-B60F-E8DBCF3EC747}" type="presOf" srcId="{ACC46A10-07B2-4540-9DAA-7D2E88B0E0F5}" destId="{2547CC94-A2DC-4A8E-BC44-1BDEBA4E69FA}" srcOrd="0" destOrd="0" presId="urn:microsoft.com/office/officeart/2005/8/layout/orgChart1"/>
     <dgm:cxn modelId="{E9D6F4D9-A919-488C-A6DC-0994D0114606}" type="presOf" srcId="{0FED4B24-979E-47FB-B1BA-C1585230BE1C}" destId="{D9B5327A-6336-49CE-879F-AEBA13E3C9AA}" srcOrd="0" destOrd="0" presId="urn:microsoft.com/office/officeart/2005/8/layout/orgChart1"/>
+    <dgm:cxn modelId="{AE87B1DA-97B9-4BD0-91CF-703189799024}" type="presOf" srcId="{570094B7-40B1-44FC-AD2A-FE02A27DBCAE}" destId="{21C75DC7-95DB-40C4-A80C-F41228540CC4}" srcOrd="0" destOrd="0" presId="urn:microsoft.com/office/officeart/2005/8/layout/orgChart1"/>
     <dgm:cxn modelId="{1C3E22DC-99FB-49CB-B61C-F25F223DBCB4}" type="presOf" srcId="{35E91644-EF0A-4581-BC5C-C89D0B7FAE04}" destId="{42340B20-A7D0-4FC8-A51E-7EA7CB2EF7DB}" srcOrd="0" destOrd="0" presId="urn:microsoft.com/office/officeart/2005/8/layout/orgChart1"/>
     <dgm:cxn modelId="{BCDEFFE0-D19A-4E43-844E-DF0EE48E5D8D}" srcId="{7AEFF893-4FCC-460A-83FB-CE255B9B2043}" destId="{35E91644-EF0A-4581-BC5C-C89D0B7FAE04}" srcOrd="0" destOrd="0" parTransId="{646E1BB7-65B7-4334-8B51-62AD68BD18A1}" sibTransId="{52F5BFB2-86A2-4810-9861-FA7A2809D328}"/>
     <dgm:cxn modelId="{326F51E3-46DC-4DF1-A1FF-0806A53E4EAB}" type="presOf" srcId="{646E1BB7-65B7-4334-8B51-62AD68BD18A1}" destId="{DD71067A-5888-4803-BF54-2E22916BF19D}" srcOrd="0" destOrd="0" presId="urn:microsoft.com/office/officeart/2005/8/layout/orgChart1"/>
-    <dgm:cxn modelId="{B72593E8-DD1E-4783-AB6A-01FDF4CC02A2}" type="presOf" srcId="{C9F5BB99-D003-42FC-853E-3DDE6F45A0A6}" destId="{59B99C9B-D27B-47B1-80A7-78A949EDE67F}" srcOrd="0" destOrd="0" presId="urn:microsoft.com/office/officeart/2005/8/layout/orgChart1"/>
     <dgm:cxn modelId="{3B291EEE-E3BA-4CE6-9125-A8BF63074D68}" type="presOf" srcId="{2B9E4904-11CE-4AD2-95F1-AB0E66B75ECB}" destId="{9A589A47-6BA7-45D9-B671-86D7DC971640}" srcOrd="0" destOrd="0" presId="urn:microsoft.com/office/officeart/2005/8/layout/orgChart1"/>
     <dgm:cxn modelId="{C1DC79FB-9315-4D5A-965A-B5B15C3D049C}" type="presOf" srcId="{5C861C4E-165F-447C-9C81-03373EF846DC}" destId="{C5CBCB4C-E4C2-44C6-8435-8B6B57113234}" srcOrd="0" destOrd="0" presId="urn:microsoft.com/office/officeart/2005/8/layout/orgChart1"/>
     <dgm:cxn modelId="{92F11642-368D-498F-A9FD-50A9F5674C52}" type="presParOf" srcId="{A226B3B5-9D20-4A23-9160-235FC3E9A9A4}" destId="{CA2DAC2F-34C2-41E4-8179-13B8A09AD9FD}" srcOrd="0" destOrd="0" presId="urn:microsoft.com/office/officeart/2005/8/layout/orgChart1"/>
@@ -1883,13 +2048,6 @@
     <dgm:cxn modelId="{493F9032-35F5-4BDD-ACE9-9D8F05AC8348}" type="presParOf" srcId="{2663AC90-A22C-444C-BB42-9543F2EBAF74}" destId="{F9009995-D160-43D1-A8D1-0539AC69A5D1}" srcOrd="1" destOrd="0" presId="urn:microsoft.com/office/officeart/2005/8/layout/orgChart1"/>
     <dgm:cxn modelId="{C5198F73-89C0-4863-A4AF-A152D65A9C9D}" type="presParOf" srcId="{D4FBD3D9-7BCA-40CE-B9AA-26298606D36C}" destId="{AF5A6D73-1179-4EFD-B24E-98DD0B34D133}" srcOrd="1" destOrd="0" presId="urn:microsoft.com/office/officeart/2005/8/layout/orgChart1"/>
     <dgm:cxn modelId="{0357264E-29C3-4061-9EDE-BBB5ED10EB96}" type="presParOf" srcId="{D4FBD3D9-7BCA-40CE-B9AA-26298606D36C}" destId="{2045EAD7-B430-44DA-AAB4-07511972BAA8}" srcOrd="2" destOrd="0" presId="urn:microsoft.com/office/officeart/2005/8/layout/orgChart1"/>
-    <dgm:cxn modelId="{BC75DF58-F6FD-43BA-ACFA-DE138A984B62}" type="presParOf" srcId="{411C3A1C-F512-402C-8E76-FCCD3F9FC641}" destId="{59B99C9B-D27B-47B1-80A7-78A949EDE67F}" srcOrd="2" destOrd="0" presId="urn:microsoft.com/office/officeart/2005/8/layout/orgChart1"/>
-    <dgm:cxn modelId="{ED2A21D6-573B-4715-AA08-EF26E494B5AE}" type="presParOf" srcId="{411C3A1C-F512-402C-8E76-FCCD3F9FC641}" destId="{3948DE96-680E-4257-904A-870EFE59AA50}" srcOrd="3" destOrd="0" presId="urn:microsoft.com/office/officeart/2005/8/layout/orgChart1"/>
-    <dgm:cxn modelId="{BFD8131F-18F5-4876-A4EE-823B22C75584}" type="presParOf" srcId="{3948DE96-680E-4257-904A-870EFE59AA50}" destId="{0F35D923-1488-4E3F-B946-009F7A670948}" srcOrd="0" destOrd="0" presId="urn:microsoft.com/office/officeart/2005/8/layout/orgChart1"/>
-    <dgm:cxn modelId="{D6738EBF-6422-485C-B6CE-6FC6B41D1FEC}" type="presParOf" srcId="{0F35D923-1488-4E3F-B946-009F7A670948}" destId="{C9CB80A4-660E-4814-91FA-BBF5877991B9}" srcOrd="0" destOrd="0" presId="urn:microsoft.com/office/officeart/2005/8/layout/orgChart1"/>
-    <dgm:cxn modelId="{C44CD78E-BB23-44D6-BADF-1156D9BB8AD4}" type="presParOf" srcId="{0F35D923-1488-4E3F-B946-009F7A670948}" destId="{85E37CE0-DE34-495F-BDC4-DCB82E8069EF}" srcOrd="1" destOrd="0" presId="urn:microsoft.com/office/officeart/2005/8/layout/orgChart1"/>
-    <dgm:cxn modelId="{28A78DD9-205E-46C5-A0B7-857C11D3CE34}" type="presParOf" srcId="{3948DE96-680E-4257-904A-870EFE59AA50}" destId="{2480478D-BB42-40AE-8CB8-D7404D2945D5}" srcOrd="1" destOrd="0" presId="urn:microsoft.com/office/officeart/2005/8/layout/orgChart1"/>
-    <dgm:cxn modelId="{F09032EF-08D7-49B9-B1C0-3D229DA7BC96}" type="presParOf" srcId="{3948DE96-680E-4257-904A-870EFE59AA50}" destId="{A051653B-2293-411C-A372-AF4A63DF0D3F}" srcOrd="2" destOrd="0" presId="urn:microsoft.com/office/officeart/2005/8/layout/orgChart1"/>
     <dgm:cxn modelId="{96D9FA0D-1CFF-4489-9C5B-FD811DF02DD3}" type="presParOf" srcId="{C7085747-3BB1-4811-BDED-70CC13865224}" destId="{F1F652D4-9FCF-401B-A55F-C496AB09FA0E}" srcOrd="2" destOrd="0" presId="urn:microsoft.com/office/officeart/2005/8/layout/orgChart1"/>
     <dgm:cxn modelId="{7A9CF579-A268-4E0A-89D5-71AAE1F4FB97}" type="presParOf" srcId="{26929FBA-E93D-45DD-8FDF-D7D004EF38BD}" destId="{2547CC94-A2DC-4A8E-BC44-1BDEBA4E69FA}" srcOrd="4" destOrd="0" presId="urn:microsoft.com/office/officeart/2005/8/layout/orgChart1"/>
     <dgm:cxn modelId="{39D456A0-FC29-4432-8997-F02584FC6430}" type="presParOf" srcId="{26929FBA-E93D-45DD-8FDF-D7D004EF38BD}" destId="{F6A9252D-9D84-4691-A80E-E9344C4F1AFD}" srcOrd="5" destOrd="0" presId="urn:microsoft.com/office/officeart/2005/8/layout/orgChart1"/>
@@ -1925,6 +2083,27 @@
     <dgm:cxn modelId="{F67E36B5-69D2-4B81-A5B6-D97E79C38AB1}" type="presParOf" srcId="{90EE65C7-D862-4089-A1B9-5EE6ED50B0C0}" destId="{D9B5327A-6336-49CE-879F-AEBA13E3C9AA}" srcOrd="0" destOrd="0" presId="urn:microsoft.com/office/officeart/2005/8/layout/orgChart1"/>
     <dgm:cxn modelId="{D91B9291-0955-4903-8A5E-D9C810D185D5}" type="presParOf" srcId="{90EE65C7-D862-4089-A1B9-5EE6ED50B0C0}" destId="{0D44A240-59CA-48BB-B01D-A37DD223F8E3}" srcOrd="1" destOrd="0" presId="urn:microsoft.com/office/officeart/2005/8/layout/orgChart1"/>
     <dgm:cxn modelId="{22FB92AF-A77A-4584-95FE-2A35E3C9DE4B}" type="presParOf" srcId="{C92423E9-8CF0-4E67-9E57-CCD351E7BA3D}" destId="{57AC3DD1-29C5-4DA0-9252-9644CD4B10C0}" srcOrd="1" destOrd="0" presId="urn:microsoft.com/office/officeart/2005/8/layout/orgChart1"/>
+    <dgm:cxn modelId="{95D3C0F7-55AC-4E4B-ADF4-F6393A682A32}" type="presParOf" srcId="{57AC3DD1-29C5-4DA0-9252-9644CD4B10C0}" destId="{0C261963-7CC4-4EBC-869B-EE1C8353F0F6}" srcOrd="0" destOrd="0" presId="urn:microsoft.com/office/officeart/2005/8/layout/orgChart1"/>
+    <dgm:cxn modelId="{1F987BD0-C3DE-4F53-AF37-DDC4D951447C}" type="presParOf" srcId="{57AC3DD1-29C5-4DA0-9252-9644CD4B10C0}" destId="{FF3F2318-C8D0-44A9-8B0B-7DBB262B704D}" srcOrd="1" destOrd="0" presId="urn:microsoft.com/office/officeart/2005/8/layout/orgChart1"/>
+    <dgm:cxn modelId="{5974F6B9-89B6-44CA-A5F5-2C373F693FF6}" type="presParOf" srcId="{FF3F2318-C8D0-44A9-8B0B-7DBB262B704D}" destId="{6EA2020D-69E9-4B44-8876-B840E84E3364}" srcOrd="0" destOrd="0" presId="urn:microsoft.com/office/officeart/2005/8/layout/orgChart1"/>
+    <dgm:cxn modelId="{0DBB9CA9-74DA-4DB2-ABE1-449CC2B32245}" type="presParOf" srcId="{6EA2020D-69E9-4B44-8876-B840E84E3364}" destId="{21C75DC7-95DB-40C4-A80C-F41228540CC4}" srcOrd="0" destOrd="0" presId="urn:microsoft.com/office/officeart/2005/8/layout/orgChart1"/>
+    <dgm:cxn modelId="{A12AE52C-397B-477C-907C-B219E1A2749B}" type="presParOf" srcId="{6EA2020D-69E9-4B44-8876-B840E84E3364}" destId="{BF5CB8FF-1810-48C4-AAAB-7B2767B6BD71}" srcOrd="1" destOrd="0" presId="urn:microsoft.com/office/officeart/2005/8/layout/orgChart1"/>
+    <dgm:cxn modelId="{C59101D2-C880-4E4B-B589-9E5C2A585C82}" type="presParOf" srcId="{FF3F2318-C8D0-44A9-8B0B-7DBB262B704D}" destId="{F2D3BDA8-8F8F-492E-8928-531DF9F331AD}" srcOrd="1" destOrd="0" presId="urn:microsoft.com/office/officeart/2005/8/layout/orgChart1"/>
+    <dgm:cxn modelId="{5B986B84-18D7-4888-B4CD-8CFC5825FAD7}" type="presParOf" srcId="{FF3F2318-C8D0-44A9-8B0B-7DBB262B704D}" destId="{B00C4F8A-8E6A-4304-B42A-F317E76E8974}" srcOrd="2" destOrd="0" presId="urn:microsoft.com/office/officeart/2005/8/layout/orgChart1"/>
+    <dgm:cxn modelId="{2D38E4B8-A8F8-49AF-B487-F393FB568871}" type="presParOf" srcId="{57AC3DD1-29C5-4DA0-9252-9644CD4B10C0}" destId="{48117D59-1497-42A3-B3B3-F638950FAA64}" srcOrd="2" destOrd="0" presId="urn:microsoft.com/office/officeart/2005/8/layout/orgChart1"/>
+    <dgm:cxn modelId="{01F01B2F-9EEC-4A59-8877-6417149F4672}" type="presParOf" srcId="{57AC3DD1-29C5-4DA0-9252-9644CD4B10C0}" destId="{E81E97CE-B58E-4C24-BA81-31F6E915D788}" srcOrd="3" destOrd="0" presId="urn:microsoft.com/office/officeart/2005/8/layout/orgChart1"/>
+    <dgm:cxn modelId="{2A2731D5-C6B5-4439-9B36-8EEF73DFE6A6}" type="presParOf" srcId="{E81E97CE-B58E-4C24-BA81-31F6E915D788}" destId="{BA480DAA-0B66-4D3A-8AD0-78C693D6A7D1}" srcOrd="0" destOrd="0" presId="urn:microsoft.com/office/officeart/2005/8/layout/orgChart1"/>
+    <dgm:cxn modelId="{F135D7A0-F8E0-4417-AFD8-E68F0EAA78C5}" type="presParOf" srcId="{BA480DAA-0B66-4D3A-8AD0-78C693D6A7D1}" destId="{BA54416D-B103-4182-8BA9-63C3B851EDB8}" srcOrd="0" destOrd="0" presId="urn:microsoft.com/office/officeart/2005/8/layout/orgChart1"/>
+    <dgm:cxn modelId="{65EBFD62-94D5-4E22-B69B-4D5323508A2F}" type="presParOf" srcId="{BA480DAA-0B66-4D3A-8AD0-78C693D6A7D1}" destId="{16936C3E-7CD0-455A-BBC0-F46908AE22F9}" srcOrd="1" destOrd="0" presId="urn:microsoft.com/office/officeart/2005/8/layout/orgChart1"/>
+    <dgm:cxn modelId="{07D206B3-F5C8-4D57-8954-775B7B73A855}" type="presParOf" srcId="{E81E97CE-B58E-4C24-BA81-31F6E915D788}" destId="{778F53D5-C7CA-4111-ADF1-469D5FF62A9F}" srcOrd="1" destOrd="0" presId="urn:microsoft.com/office/officeart/2005/8/layout/orgChart1"/>
+    <dgm:cxn modelId="{FE9AE489-23FF-43CF-B43D-29E825CF491A}" type="presParOf" srcId="{E81E97CE-B58E-4C24-BA81-31F6E915D788}" destId="{E3831ECD-4F19-4DA5-AB87-5F13E860BFB4}" srcOrd="2" destOrd="0" presId="urn:microsoft.com/office/officeart/2005/8/layout/orgChart1"/>
+    <dgm:cxn modelId="{64589D09-5D74-4834-A799-82B1DFB231DF}" type="presParOf" srcId="{57AC3DD1-29C5-4DA0-9252-9644CD4B10C0}" destId="{AD8BCDFE-3794-4439-87E7-7B650A2CCEBF}" srcOrd="4" destOrd="0" presId="urn:microsoft.com/office/officeart/2005/8/layout/orgChart1"/>
+    <dgm:cxn modelId="{CD51F756-7BA4-4072-9F0E-A189A149694A}" type="presParOf" srcId="{57AC3DD1-29C5-4DA0-9252-9644CD4B10C0}" destId="{BEAE0C38-2D53-4303-96AE-102EC0B89327}" srcOrd="5" destOrd="0" presId="urn:microsoft.com/office/officeart/2005/8/layout/orgChart1"/>
+    <dgm:cxn modelId="{4BA89487-689D-47A6-B705-8FB1EE4BE2F2}" type="presParOf" srcId="{BEAE0C38-2D53-4303-96AE-102EC0B89327}" destId="{7FF6081E-60CF-4632-AB79-49DE599C75F0}" srcOrd="0" destOrd="0" presId="urn:microsoft.com/office/officeart/2005/8/layout/orgChart1"/>
+    <dgm:cxn modelId="{0101DDA6-FF7F-4A5C-B04A-534745113520}" type="presParOf" srcId="{7FF6081E-60CF-4632-AB79-49DE599C75F0}" destId="{6FF7F16C-89F2-4EFB-9949-06592EABB9E1}" srcOrd="0" destOrd="0" presId="urn:microsoft.com/office/officeart/2005/8/layout/orgChart1"/>
+    <dgm:cxn modelId="{1984A903-2D7A-4C9C-825E-DEAA1E3D6C9E}" type="presParOf" srcId="{7FF6081E-60CF-4632-AB79-49DE599C75F0}" destId="{EC84D945-7997-4681-A754-52D6E71BF8C7}" srcOrd="1" destOrd="0" presId="urn:microsoft.com/office/officeart/2005/8/layout/orgChart1"/>
+    <dgm:cxn modelId="{C845C49A-13DE-4799-8296-55AF85AF11AA}" type="presParOf" srcId="{BEAE0C38-2D53-4303-96AE-102EC0B89327}" destId="{7BC8D9A3-C7AA-472B-8E21-3390F7BE8D23}" srcOrd="1" destOrd="0" presId="urn:microsoft.com/office/officeart/2005/8/layout/orgChart1"/>
+    <dgm:cxn modelId="{635DC3A3-D615-4DF7-8C14-FA6E6BDDF23F}" type="presParOf" srcId="{BEAE0C38-2D53-4303-96AE-102EC0B89327}" destId="{AB77898D-B279-4F4E-8316-CFC98616B37A}" srcOrd="2" destOrd="0" presId="urn:microsoft.com/office/officeart/2005/8/layout/orgChart1"/>
     <dgm:cxn modelId="{F29B0571-C1E7-4C97-9171-BF1B84F9E48F}" type="presParOf" srcId="{C92423E9-8CF0-4E67-9E57-CCD351E7BA3D}" destId="{EEA40560-6550-450F-A876-833A019237D2}" srcOrd="2" destOrd="0" presId="urn:microsoft.com/office/officeart/2005/8/layout/orgChart1"/>
     <dgm:cxn modelId="{6BBA0735-CA19-4471-B8E8-8568BB5B3DC3}" type="presParOf" srcId="{CA2DAC2F-34C2-41E4-8179-13B8A09AD9FD}" destId="{F5F85F14-0B7C-4BBE-8608-8056E06878B3}" srcOrd="2" destOrd="0" presId="urn:microsoft.com/office/officeart/2005/8/layout/orgChart1"/>
   </dgm:cxnLst>
@@ -1932,7 +2111,7 @@
   <dgm:whole/>
   <dgm:extLst>
     <a:ext uri="http://schemas.microsoft.com/office/drawing/2008/diagram">
-      <dsp:dataModelExt xmlns:dsp="http://schemas.microsoft.com/office/drawing/2008/diagram" relId="rId6" minVer="http://schemas.openxmlformats.org/drawingml/2006/diagram"/>
+      <dsp:dataModelExt xmlns:dsp="http://schemas.microsoft.com/office/drawing/2008/diagram" relId="rId7" minVer="http://schemas.openxmlformats.org/drawingml/2006/diagram"/>
     </a:ext>
   </dgm:extLst>
 </dgm:dataModel>
@@ -1946,6 +2125,183 @@
       <dsp:cNvGrpSpPr/>
     </dsp:nvGrpSpPr>
     <dsp:grpSpPr/>
+    <dsp:sp modelId="{AD8BCDFE-3794-4439-87E7-7B650A2CCEBF}">
+      <dsp:nvSpPr>
+        <dsp:cNvPr id="0" name=""/>
+        <dsp:cNvSpPr/>
+      </dsp:nvSpPr>
+      <dsp:spPr>
+        <a:xfrm>
+          <a:off x="6019448" y="1969971"/>
+          <a:ext cx="380558" cy="3042923"/>
+        </a:xfrm>
+        <a:custGeom>
+          <a:avLst/>
+          <a:gdLst/>
+          <a:ahLst/>
+          <a:cxnLst/>
+          <a:rect l="0" t="0" r="0" b="0"/>
+          <a:pathLst>
+            <a:path>
+              <a:moveTo>
+                <a:pt x="0" y="0"/>
+              </a:moveTo>
+              <a:lnTo>
+                <a:pt x="0" y="3042923"/>
+              </a:lnTo>
+              <a:lnTo>
+                <a:pt x="380558" y="3042923"/>
+              </a:lnTo>
+            </a:path>
+          </a:pathLst>
+        </a:custGeom>
+        <a:noFill/>
+        <a:ln w="12700" cap="flat" cmpd="sng" algn="ctr">
+          <a:solidFill>
+            <a:schemeClr val="accent1">
+              <a:shade val="80000"/>
+              <a:hueOff val="0"/>
+              <a:satOff val="0"/>
+              <a:lumOff val="0"/>
+              <a:alphaOff val="0"/>
+            </a:schemeClr>
+          </a:solidFill>
+          <a:prstDash val="solid"/>
+          <a:miter lim="800000"/>
+        </a:ln>
+        <a:effectLst/>
+      </dsp:spPr>
+      <dsp:style>
+        <a:lnRef idx="2">
+          <a:scrgbClr r="0" g="0" b="0"/>
+        </a:lnRef>
+        <a:fillRef idx="0">
+          <a:scrgbClr r="0" g="0" b="0"/>
+        </a:fillRef>
+        <a:effectRef idx="0">
+          <a:scrgbClr r="0" g="0" b="0"/>
+        </a:effectRef>
+        <a:fontRef idx="minor"/>
+      </dsp:style>
+    </dsp:sp>
+    <dsp:sp modelId="{48117D59-1497-42A3-B3B3-F638950FAA64}">
+      <dsp:nvSpPr>
+        <dsp:cNvPr id="0" name=""/>
+        <dsp:cNvSpPr/>
+      </dsp:nvSpPr>
+      <dsp:spPr>
+        <a:xfrm>
+          <a:off x="6019448" y="1969971"/>
+          <a:ext cx="380558" cy="1891143"/>
+        </a:xfrm>
+        <a:custGeom>
+          <a:avLst/>
+          <a:gdLst/>
+          <a:ahLst/>
+          <a:cxnLst/>
+          <a:rect l="0" t="0" r="0" b="0"/>
+          <a:pathLst>
+            <a:path>
+              <a:moveTo>
+                <a:pt x="0" y="0"/>
+              </a:moveTo>
+              <a:lnTo>
+                <a:pt x="0" y="1891143"/>
+              </a:lnTo>
+              <a:lnTo>
+                <a:pt x="380558" y="1891143"/>
+              </a:lnTo>
+            </a:path>
+          </a:pathLst>
+        </a:custGeom>
+        <a:noFill/>
+        <a:ln w="12700" cap="flat" cmpd="sng" algn="ctr">
+          <a:solidFill>
+            <a:schemeClr val="accent1">
+              <a:shade val="80000"/>
+              <a:hueOff val="0"/>
+              <a:satOff val="0"/>
+              <a:lumOff val="0"/>
+              <a:alphaOff val="0"/>
+            </a:schemeClr>
+          </a:solidFill>
+          <a:prstDash val="solid"/>
+          <a:miter lim="800000"/>
+        </a:ln>
+        <a:effectLst/>
+      </dsp:spPr>
+      <dsp:style>
+        <a:lnRef idx="2">
+          <a:scrgbClr r="0" g="0" b="0"/>
+        </a:lnRef>
+        <a:fillRef idx="0">
+          <a:scrgbClr r="0" g="0" b="0"/>
+        </a:fillRef>
+        <a:effectRef idx="0">
+          <a:scrgbClr r="0" g="0" b="0"/>
+        </a:effectRef>
+        <a:fontRef idx="minor"/>
+      </dsp:style>
+    </dsp:sp>
+    <dsp:sp modelId="{0C261963-7CC4-4EBC-869B-EE1C8353F0F6}">
+      <dsp:nvSpPr>
+        <dsp:cNvPr id="0" name=""/>
+        <dsp:cNvSpPr/>
+      </dsp:nvSpPr>
+      <dsp:spPr>
+        <a:xfrm>
+          <a:off x="6019448" y="1969971"/>
+          <a:ext cx="380558" cy="739362"/>
+        </a:xfrm>
+        <a:custGeom>
+          <a:avLst/>
+          <a:gdLst/>
+          <a:ahLst/>
+          <a:cxnLst/>
+          <a:rect l="0" t="0" r="0" b="0"/>
+          <a:pathLst>
+            <a:path>
+              <a:moveTo>
+                <a:pt x="0" y="0"/>
+              </a:moveTo>
+              <a:lnTo>
+                <a:pt x="0" y="739362"/>
+              </a:lnTo>
+              <a:lnTo>
+                <a:pt x="380558" y="739362"/>
+              </a:lnTo>
+            </a:path>
+          </a:pathLst>
+        </a:custGeom>
+        <a:noFill/>
+        <a:ln w="12700" cap="flat" cmpd="sng" algn="ctr">
+          <a:solidFill>
+            <a:schemeClr val="accent1">
+              <a:shade val="80000"/>
+              <a:hueOff val="0"/>
+              <a:satOff val="0"/>
+              <a:lumOff val="0"/>
+              <a:alphaOff val="0"/>
+            </a:schemeClr>
+          </a:solidFill>
+          <a:prstDash val="solid"/>
+          <a:miter lim="800000"/>
+        </a:ln>
+        <a:effectLst/>
+      </dsp:spPr>
+      <dsp:style>
+        <a:lnRef idx="2">
+          <a:scrgbClr r="0" g="0" b="0"/>
+        </a:lnRef>
+        <a:fillRef idx="0">
+          <a:scrgbClr r="0" g="0" b="0"/>
+        </a:fillRef>
+        <a:effectRef idx="0">
+          <a:scrgbClr r="0" g="0" b="0"/>
+        </a:effectRef>
+        <a:fontRef idx="minor"/>
+      </dsp:style>
+    </dsp:sp>
     <dsp:sp modelId="{14BC8A60-44FF-45BF-A86A-F7194A98A442}">
       <dsp:nvSpPr>
         <dsp:cNvPr id="0" name=""/>
@@ -1953,7 +2309,7 @@
       </dsp:nvSpPr>
       <dsp:spPr>
         <a:xfrm>
-          <a:off x="4064000" y="811328"/>
+          <a:off x="3861221" y="811328"/>
           <a:ext cx="2807117" cy="347529"/>
         </a:xfrm>
         <a:custGeom>
@@ -2015,7 +2371,7 @@
       </dsp:nvSpPr>
       <dsp:spPr>
         <a:xfrm>
-          <a:off x="4396556" y="1963109"/>
+          <a:off x="4193778" y="1963109"/>
           <a:ext cx="243333" cy="3049785"/>
         </a:xfrm>
         <a:custGeom>
@@ -2074,7 +2430,7 @@
       </dsp:nvSpPr>
       <dsp:spPr>
         <a:xfrm>
-          <a:off x="4396556" y="1963109"/>
+          <a:off x="4193778" y="1963109"/>
           <a:ext cx="243333" cy="1898005"/>
         </a:xfrm>
         <a:custGeom>
@@ -2133,7 +2489,7 @@
       </dsp:nvSpPr>
       <dsp:spPr>
         <a:xfrm>
-          <a:off x="4396556" y="1963109"/>
+          <a:off x="4193778" y="1963109"/>
           <a:ext cx="243333" cy="746224"/>
         </a:xfrm>
         <a:custGeom>
@@ -2192,7 +2548,7 @@
       </dsp:nvSpPr>
       <dsp:spPr>
         <a:xfrm>
-          <a:off x="4064000" y="811328"/>
+          <a:off x="3861221" y="811328"/>
           <a:ext cx="981447" cy="340667"/>
         </a:xfrm>
         <a:custGeom>
@@ -2247,65 +2603,6 @@
         <a:fontRef idx="minor"/>
       </dsp:style>
     </dsp:sp>
-    <dsp:sp modelId="{59B99C9B-D27B-47B1-80A7-78A949EDE67F}">
-      <dsp:nvSpPr>
-        <dsp:cNvPr id="0" name=""/>
-        <dsp:cNvSpPr/>
-      </dsp:nvSpPr>
-      <dsp:spPr>
-        <a:xfrm>
-          <a:off x="2433662" y="1963109"/>
-          <a:ext cx="243333" cy="1898005"/>
-        </a:xfrm>
-        <a:custGeom>
-          <a:avLst/>
-          <a:gdLst/>
-          <a:ahLst/>
-          <a:cxnLst/>
-          <a:rect l="0" t="0" r="0" b="0"/>
-          <a:pathLst>
-            <a:path>
-              <a:moveTo>
-                <a:pt x="0" y="0"/>
-              </a:moveTo>
-              <a:lnTo>
-                <a:pt x="0" y="1898005"/>
-              </a:lnTo>
-              <a:lnTo>
-                <a:pt x="243333" y="1898005"/>
-              </a:lnTo>
-            </a:path>
-          </a:pathLst>
-        </a:custGeom>
-        <a:noFill/>
-        <a:ln w="12700" cap="flat" cmpd="sng" algn="ctr">
-          <a:solidFill>
-            <a:schemeClr val="accent1">
-              <a:shade val="80000"/>
-              <a:hueOff val="0"/>
-              <a:satOff val="0"/>
-              <a:lumOff val="0"/>
-              <a:alphaOff val="0"/>
-            </a:schemeClr>
-          </a:solidFill>
-          <a:prstDash val="solid"/>
-          <a:miter lim="800000"/>
-        </a:ln>
-        <a:effectLst/>
-      </dsp:spPr>
-      <dsp:style>
-        <a:lnRef idx="2">
-          <a:scrgbClr r="0" g="0" b="0"/>
-        </a:lnRef>
-        <a:fillRef idx="0">
-          <a:scrgbClr r="0" g="0" b="0"/>
-        </a:fillRef>
-        <a:effectRef idx="0">
-          <a:scrgbClr r="0" g="0" b="0"/>
-        </a:effectRef>
-        <a:fontRef idx="minor"/>
-      </dsp:style>
-    </dsp:sp>
     <dsp:sp modelId="{7DF221ED-BE9E-4AC9-9FCC-3AE38A0F8C63}">
       <dsp:nvSpPr>
         <dsp:cNvPr id="0" name=""/>
@@ -2313,7 +2610,7 @@
       </dsp:nvSpPr>
       <dsp:spPr>
         <a:xfrm>
-          <a:off x="2433662" y="1963109"/>
+          <a:off x="2230883" y="1963109"/>
           <a:ext cx="243333" cy="746224"/>
         </a:xfrm>
         <a:custGeom>
@@ -2372,7 +2669,7 @@
       </dsp:nvSpPr>
       <dsp:spPr>
         <a:xfrm>
-          <a:off x="3082552" y="811328"/>
+          <a:off x="2879774" y="811328"/>
           <a:ext cx="981447" cy="340667"/>
         </a:xfrm>
         <a:custGeom>
@@ -2434,7 +2731,7 @@
       </dsp:nvSpPr>
       <dsp:spPr>
         <a:xfrm>
-          <a:off x="470768" y="1963109"/>
+          <a:off x="267989" y="1963109"/>
           <a:ext cx="243333" cy="1898005"/>
         </a:xfrm>
         <a:custGeom>
@@ -2493,7 +2790,7 @@
       </dsp:nvSpPr>
       <dsp:spPr>
         <a:xfrm>
-          <a:off x="470768" y="1963109"/>
+          <a:off x="267989" y="1963109"/>
           <a:ext cx="243333" cy="746224"/>
         </a:xfrm>
         <a:custGeom>
@@ -2552,7 +2849,7 @@
       </dsp:nvSpPr>
       <dsp:spPr>
         <a:xfrm>
-          <a:off x="1119658" y="811328"/>
+          <a:off x="916880" y="811328"/>
           <a:ext cx="2944341" cy="340667"/>
         </a:xfrm>
         <a:custGeom>
@@ -2614,7 +2911,7 @@
       </dsp:nvSpPr>
       <dsp:spPr>
         <a:xfrm>
-          <a:off x="3252886" y="215"/>
+          <a:off x="3050108" y="215"/>
           <a:ext cx="1622226" cy="811113"/>
         </a:xfrm>
         <a:prstGeom prst="rect">
@@ -2678,14 +2975,11 @@
             <a:rPr lang="en-GB" sz="2000" kern="1200" dirty="0" err="1"/>
             <a:t>CFDwavemaker</a:t>
           </a:r>
-          <a:r>
-            <a:rPr lang="en-GB" sz="2000" kern="1200" dirty="0"/>
-            <a:t> Theories</a:t>
-          </a:r>
+          <a:endParaRPr lang="en-GB" sz="2000" kern="1200" dirty="0"/>
         </a:p>
       </dsp:txBody>
       <dsp:txXfrm>
-        <a:off x="3252886" y="215"/>
+        <a:off x="3050108" y="215"/>
         <a:ext cx="1622226" cy="811113"/>
       </dsp:txXfrm>
     </dsp:sp>
@@ -2696,7 +2990,7 @@
       </dsp:nvSpPr>
       <dsp:spPr>
         <a:xfrm>
-          <a:off x="308545" y="1151996"/>
+          <a:off x="105767" y="1151996"/>
           <a:ext cx="1622226" cy="811113"/>
         </a:xfrm>
         <a:prstGeom prst="rect">
@@ -2763,7 +3057,7 @@
         </a:p>
       </dsp:txBody>
       <dsp:txXfrm>
-        <a:off x="308545" y="1151996"/>
+        <a:off x="105767" y="1151996"/>
         <a:ext cx="1622226" cy="811113"/>
       </dsp:txXfrm>
     </dsp:sp>
@@ -2774,7 +3068,7 @@
       </dsp:nvSpPr>
       <dsp:spPr>
         <a:xfrm>
-          <a:off x="714102" y="2303776"/>
+          <a:off x="511323" y="2303776"/>
           <a:ext cx="1622226" cy="811113"/>
         </a:xfrm>
         <a:prstGeom prst="rect">
@@ -2836,7 +3130,7 @@
         </a:p>
       </dsp:txBody>
       <dsp:txXfrm>
-        <a:off x="714102" y="2303776"/>
+        <a:off x="511323" y="2303776"/>
         <a:ext cx="1622226" cy="811113"/>
       </dsp:txXfrm>
     </dsp:sp>
@@ -2847,7 +3141,7 @@
       </dsp:nvSpPr>
       <dsp:spPr>
         <a:xfrm>
-          <a:off x="714102" y="3455557"/>
+          <a:off x="511323" y="3455557"/>
           <a:ext cx="1622226" cy="811113"/>
         </a:xfrm>
         <a:prstGeom prst="rect">
@@ -2909,7 +3203,7 @@
         </a:p>
       </dsp:txBody>
       <dsp:txXfrm>
-        <a:off x="714102" y="3455557"/>
+        <a:off x="511323" y="3455557"/>
         <a:ext cx="1622226" cy="811113"/>
       </dsp:txXfrm>
     </dsp:sp>
@@ -2920,7 +3214,7 @@
       </dsp:nvSpPr>
       <dsp:spPr>
         <a:xfrm>
-          <a:off x="2271439" y="1151996"/>
+          <a:off x="2068661" y="1151996"/>
           <a:ext cx="1622226" cy="811113"/>
         </a:xfrm>
         <a:prstGeom prst="rect">
@@ -2987,7 +3281,7 @@
         </a:p>
       </dsp:txBody>
       <dsp:txXfrm>
-        <a:off x="2271439" y="1151996"/>
+        <a:off x="2068661" y="1151996"/>
         <a:ext cx="1622226" cy="811113"/>
       </dsp:txXfrm>
     </dsp:sp>
@@ -2998,7 +3292,7 @@
       </dsp:nvSpPr>
       <dsp:spPr>
         <a:xfrm>
-          <a:off x="2676996" y="2303776"/>
+          <a:off x="2474217" y="2303776"/>
           <a:ext cx="1622226" cy="811113"/>
         </a:xfrm>
         <a:prstGeom prst="rect">
@@ -3065,80 +3359,7 @@
         </a:p>
       </dsp:txBody>
       <dsp:txXfrm>
-        <a:off x="2676996" y="2303776"/>
-        <a:ext cx="1622226" cy="811113"/>
-      </dsp:txXfrm>
-    </dsp:sp>
-    <dsp:sp modelId="{C9CB80A4-660E-4814-91FA-BBF5877991B9}">
-      <dsp:nvSpPr>
-        <dsp:cNvPr id="0" name=""/>
-        <dsp:cNvSpPr/>
-      </dsp:nvSpPr>
-      <dsp:spPr>
-        <a:xfrm>
-          <a:off x="2676996" y="3455557"/>
-          <a:ext cx="1622226" cy="811113"/>
-        </a:xfrm>
-        <a:prstGeom prst="rect">
-          <a:avLst/>
-        </a:prstGeom>
-        <a:solidFill>
-          <a:schemeClr val="accent2"/>
-        </a:solidFill>
-        <a:ln w="12700" cap="flat" cmpd="sng" algn="ctr">
-          <a:solidFill>
-            <a:schemeClr val="lt1">
-              <a:hueOff val="0"/>
-              <a:satOff val="0"/>
-              <a:lumOff val="0"/>
-              <a:alphaOff val="0"/>
-            </a:schemeClr>
-          </a:solidFill>
-          <a:prstDash val="solid"/>
-          <a:miter lim="800000"/>
-        </a:ln>
-        <a:effectLst/>
-      </dsp:spPr>
-      <dsp:style>
-        <a:lnRef idx="2">
-          <a:scrgbClr r="0" g="0" b="0"/>
-        </a:lnRef>
-        <a:fillRef idx="1">
-          <a:scrgbClr r="0" g="0" b="0"/>
-        </a:fillRef>
-        <a:effectRef idx="0">
-          <a:scrgbClr r="0" g="0" b="0"/>
-        </a:effectRef>
-        <a:fontRef idx="minor">
-          <a:schemeClr val="lt1"/>
-        </a:fontRef>
-      </dsp:style>
-      <dsp:txBody>
-        <a:bodyPr spcFirstLastPara="0" vert="horz" wrap="square" lIns="12700" tIns="12700" rIns="12700" bIns="12700" numCol="1" spcCol="1270" anchor="ctr" anchorCtr="0">
-          <a:noAutofit/>
-        </a:bodyPr>
-        <a:lstStyle/>
-        <a:p>
-          <a:pPr marL="0" lvl="0" indent="0" algn="ctr" defTabSz="889000">
-            <a:lnSpc>
-              <a:spcPct val="90000"/>
-            </a:lnSpc>
-            <a:spcBef>
-              <a:spcPct val="0"/>
-            </a:spcBef>
-            <a:spcAft>
-              <a:spcPct val="35000"/>
-            </a:spcAft>
-            <a:buNone/>
-          </a:pPr>
-          <a:r>
-            <a:rPr lang="en-GB" sz="2000" kern="1200" dirty="0"/>
-            <a:t>Stream function</a:t>
-          </a:r>
-        </a:p>
-      </dsp:txBody>
-      <dsp:txXfrm>
-        <a:off x="2676996" y="3455557"/>
+        <a:off x="2474217" y="2303776"/>
         <a:ext cx="1622226" cy="811113"/>
       </dsp:txXfrm>
     </dsp:sp>
@@ -3149,7 +3370,7 @@
       </dsp:nvSpPr>
       <dsp:spPr>
         <a:xfrm>
-          <a:off x="4234333" y="1151996"/>
+          <a:off x="4031555" y="1151996"/>
           <a:ext cx="1622226" cy="811113"/>
         </a:xfrm>
         <a:prstGeom prst="rect">
@@ -3216,7 +3437,7 @@
         </a:p>
       </dsp:txBody>
       <dsp:txXfrm>
-        <a:off x="4234333" y="1151996"/>
+        <a:off x="4031555" y="1151996"/>
         <a:ext cx="1622226" cy="811113"/>
       </dsp:txXfrm>
     </dsp:sp>
@@ -3227,7 +3448,7 @@
       </dsp:nvSpPr>
       <dsp:spPr>
         <a:xfrm>
-          <a:off x="4639890" y="2303776"/>
+          <a:off x="4437112" y="2303776"/>
           <a:ext cx="1622226" cy="811113"/>
         </a:xfrm>
         <a:prstGeom prst="rect">
@@ -3289,7 +3510,7 @@
         </a:p>
       </dsp:txBody>
       <dsp:txXfrm>
-        <a:off x="4639890" y="2303776"/>
+        <a:off x="4437112" y="2303776"/>
         <a:ext cx="1622226" cy="811113"/>
       </dsp:txXfrm>
     </dsp:sp>
@@ -3300,7 +3521,7 @@
       </dsp:nvSpPr>
       <dsp:spPr>
         <a:xfrm>
-          <a:off x="4639890" y="3455557"/>
+          <a:off x="4437112" y="3455557"/>
           <a:ext cx="1622226" cy="811113"/>
         </a:xfrm>
         <a:prstGeom prst="rect">
@@ -3366,7 +3587,7 @@
         </a:p>
       </dsp:txBody>
       <dsp:txXfrm>
-        <a:off x="4639890" y="3455557"/>
+        <a:off x="4437112" y="3455557"/>
         <a:ext cx="1622226" cy="811113"/>
       </dsp:txXfrm>
     </dsp:sp>
@@ -3377,7 +3598,7 @@
       </dsp:nvSpPr>
       <dsp:spPr>
         <a:xfrm>
-          <a:off x="4639890" y="4607338"/>
+          <a:off x="4437112" y="4607338"/>
           <a:ext cx="1622226" cy="811113"/>
         </a:xfrm>
         <a:prstGeom prst="rect">
@@ -3447,7 +3668,7 @@
         </a:p>
       </dsp:txBody>
       <dsp:txXfrm>
-        <a:off x="4639890" y="4607338"/>
+        <a:off x="4437112" y="4607338"/>
         <a:ext cx="1622226" cy="811113"/>
       </dsp:txXfrm>
     </dsp:sp>
@@ -3458,14 +3679,14 @@
       </dsp:nvSpPr>
       <dsp:spPr>
         <a:xfrm>
-          <a:off x="6060003" y="1158858"/>
+          <a:off x="5857225" y="1158858"/>
           <a:ext cx="1622226" cy="811113"/>
         </a:xfrm>
         <a:prstGeom prst="rect">
           <a:avLst/>
         </a:prstGeom>
         <a:solidFill>
-          <a:srgbClr val="ED7D31"/>
+          <a:srgbClr val="4472C4"/>
         </a:solidFill>
         <a:ln w="12700" cap="flat" cmpd="sng" algn="ctr">
           <a:solidFill>
@@ -3520,7 +3741,226 @@
         </a:p>
       </dsp:txBody>
       <dsp:txXfrm>
-        <a:off x="6060003" y="1158858"/>
+        <a:off x="5857225" y="1158858"/>
+        <a:ext cx="1622226" cy="811113"/>
+      </dsp:txXfrm>
+    </dsp:sp>
+    <dsp:sp modelId="{21C75DC7-95DB-40C4-A80C-F41228540CC4}">
+      <dsp:nvSpPr>
+        <dsp:cNvPr id="0" name=""/>
+        <dsp:cNvSpPr/>
+      </dsp:nvSpPr>
+      <dsp:spPr>
+        <a:xfrm>
+          <a:off x="6400006" y="2303776"/>
+          <a:ext cx="1622226" cy="811113"/>
+        </a:xfrm>
+        <a:prstGeom prst="rect">
+          <a:avLst/>
+        </a:prstGeom>
+        <a:solidFill>
+          <a:srgbClr val="7030A0"/>
+        </a:solidFill>
+        <a:ln w="12700" cap="flat" cmpd="sng" algn="ctr">
+          <a:solidFill>
+            <a:schemeClr val="lt1">
+              <a:hueOff val="0"/>
+              <a:satOff val="0"/>
+              <a:lumOff val="0"/>
+              <a:alphaOff val="0"/>
+            </a:schemeClr>
+          </a:solidFill>
+          <a:prstDash val="solid"/>
+          <a:miter lim="800000"/>
+        </a:ln>
+        <a:effectLst/>
+      </dsp:spPr>
+      <dsp:style>
+        <a:lnRef idx="2">
+          <a:scrgbClr r="0" g="0" b="0"/>
+        </a:lnRef>
+        <a:fillRef idx="1">
+          <a:scrgbClr r="0" g="0" b="0"/>
+        </a:fillRef>
+        <a:effectRef idx="0">
+          <a:scrgbClr r="0" g="0" b="0"/>
+        </a:effectRef>
+        <a:fontRef idx="minor">
+          <a:schemeClr val="lt1"/>
+        </a:fontRef>
+      </dsp:style>
+      <dsp:txBody>
+        <a:bodyPr spcFirstLastPara="0" vert="horz" wrap="square" lIns="12700" tIns="12700" rIns="12700" bIns="12700" numCol="1" spcCol="1270" anchor="ctr" anchorCtr="0">
+          <a:noAutofit/>
+        </a:bodyPr>
+        <a:lstStyle/>
+        <a:p>
+          <a:pPr marL="0" lvl="0" indent="0" algn="ctr" defTabSz="889000">
+            <a:lnSpc>
+              <a:spcPct val="90000"/>
+            </a:lnSpc>
+            <a:spcBef>
+              <a:spcPct val="0"/>
+            </a:spcBef>
+            <a:spcAft>
+              <a:spcPct val="35000"/>
+            </a:spcAft>
+            <a:buNone/>
+          </a:pPr>
+          <a:r>
+            <a:rPr lang="en-GB" sz="2000" kern="1200" dirty="0"/>
+            <a:t>HOSM</a:t>
+          </a:r>
+        </a:p>
+      </dsp:txBody>
+      <dsp:txXfrm>
+        <a:off x="6400006" y="2303776"/>
+        <a:ext cx="1622226" cy="811113"/>
+      </dsp:txXfrm>
+    </dsp:sp>
+    <dsp:sp modelId="{BA54416D-B103-4182-8BA9-63C3B851EDB8}">
+      <dsp:nvSpPr>
+        <dsp:cNvPr id="0" name=""/>
+        <dsp:cNvSpPr/>
+      </dsp:nvSpPr>
+      <dsp:spPr>
+        <a:xfrm>
+          <a:off x="6400006" y="3455557"/>
+          <a:ext cx="1622226" cy="811113"/>
+        </a:xfrm>
+        <a:prstGeom prst="rect">
+          <a:avLst/>
+        </a:prstGeom>
+        <a:solidFill>
+          <a:srgbClr val="7030A0"/>
+        </a:solidFill>
+        <a:ln w="12700" cap="flat" cmpd="sng" algn="ctr">
+          <a:solidFill>
+            <a:schemeClr val="lt1">
+              <a:hueOff val="0"/>
+              <a:satOff val="0"/>
+              <a:lumOff val="0"/>
+              <a:alphaOff val="0"/>
+            </a:schemeClr>
+          </a:solidFill>
+          <a:prstDash val="solid"/>
+          <a:miter lim="800000"/>
+        </a:ln>
+        <a:effectLst/>
+      </dsp:spPr>
+      <dsp:style>
+        <a:lnRef idx="2">
+          <a:scrgbClr r="0" g="0" b="0"/>
+        </a:lnRef>
+        <a:fillRef idx="1">
+          <a:scrgbClr r="0" g="0" b="0"/>
+        </a:fillRef>
+        <a:effectRef idx="0">
+          <a:scrgbClr r="0" g="0" b="0"/>
+        </a:effectRef>
+        <a:fontRef idx="minor">
+          <a:schemeClr val="lt1"/>
+        </a:fontRef>
+      </dsp:style>
+      <dsp:txBody>
+        <a:bodyPr spcFirstLastPara="0" vert="horz" wrap="square" lIns="12700" tIns="12700" rIns="12700" bIns="12700" numCol="1" spcCol="1270" anchor="ctr" anchorCtr="0">
+          <a:noAutofit/>
+        </a:bodyPr>
+        <a:lstStyle/>
+        <a:p>
+          <a:pPr marL="0" lvl="0" indent="0" algn="ctr" defTabSz="889000">
+            <a:lnSpc>
+              <a:spcPct val="90000"/>
+            </a:lnSpc>
+            <a:spcBef>
+              <a:spcPct val="0"/>
+            </a:spcBef>
+            <a:spcAft>
+              <a:spcPct val="35000"/>
+            </a:spcAft>
+            <a:buNone/>
+          </a:pPr>
+          <a:r>
+            <a:rPr lang="en-GB" sz="2000" kern="1200" dirty="0"/>
+            <a:t>Stream function</a:t>
+          </a:r>
+        </a:p>
+      </dsp:txBody>
+      <dsp:txXfrm>
+        <a:off x="6400006" y="3455557"/>
+        <a:ext cx="1622226" cy="811113"/>
+      </dsp:txXfrm>
+    </dsp:sp>
+    <dsp:sp modelId="{6FF7F16C-89F2-4EFB-9949-06592EABB9E1}">
+      <dsp:nvSpPr>
+        <dsp:cNvPr id="0" name=""/>
+        <dsp:cNvSpPr/>
+      </dsp:nvSpPr>
+      <dsp:spPr>
+        <a:xfrm>
+          <a:off x="6400006" y="4607338"/>
+          <a:ext cx="1622226" cy="811113"/>
+        </a:xfrm>
+        <a:prstGeom prst="rect">
+          <a:avLst/>
+        </a:prstGeom>
+        <a:solidFill>
+          <a:srgbClr val="7030A0"/>
+        </a:solidFill>
+        <a:ln w="12700" cap="flat" cmpd="sng" algn="ctr">
+          <a:solidFill>
+            <a:schemeClr val="lt1">
+              <a:hueOff val="0"/>
+              <a:satOff val="0"/>
+              <a:lumOff val="0"/>
+              <a:alphaOff val="0"/>
+            </a:schemeClr>
+          </a:solidFill>
+          <a:prstDash val="solid"/>
+          <a:miter lim="800000"/>
+        </a:ln>
+        <a:effectLst/>
+      </dsp:spPr>
+      <dsp:style>
+        <a:lnRef idx="2">
+          <a:scrgbClr r="0" g="0" b="0"/>
+        </a:lnRef>
+        <a:fillRef idx="1">
+          <a:scrgbClr r="0" g="0" b="0"/>
+        </a:fillRef>
+        <a:effectRef idx="0">
+          <a:scrgbClr r="0" g="0" b="0"/>
+        </a:effectRef>
+        <a:fontRef idx="minor">
+          <a:schemeClr val="lt1"/>
+        </a:fontRef>
+      </dsp:style>
+      <dsp:txBody>
+        <a:bodyPr spcFirstLastPara="0" vert="horz" wrap="square" lIns="12700" tIns="12700" rIns="12700" bIns="12700" numCol="1" spcCol="1270" anchor="ctr" anchorCtr="0">
+          <a:noAutofit/>
+        </a:bodyPr>
+        <a:lstStyle/>
+        <a:p>
+          <a:pPr marL="0" lvl="0" indent="0" algn="ctr" defTabSz="889000">
+            <a:lnSpc>
+              <a:spcPct val="90000"/>
+            </a:lnSpc>
+            <a:spcBef>
+              <a:spcPct val="0"/>
+            </a:spcBef>
+            <a:spcAft>
+              <a:spcPct val="35000"/>
+            </a:spcAft>
+            <a:buNone/>
+          </a:pPr>
+          <a:r>
+            <a:rPr lang="en-GB" sz="2000" kern="1200" dirty="0"/>
+            <a:t>Fenton Stokes waves</a:t>
+          </a:r>
+        </a:p>
+      </dsp:txBody>
+      <dsp:txXfrm>
+        <a:off x="6400006" y="4607338"/>
         <a:ext cx="1622226" cy="811113"/>
       </dsp:txXfrm>
     </dsp:sp>
@@ -5708,6 +6148,440 @@
 </dgm:styleDef>
 </file>
 
+<file path=ppt/notesMasters/notesMaster1.xml><?xml version="1.0" encoding="utf-8"?>
+<p:notesMaster xmlns:a="http://schemas.openxmlformats.org/drawingml/2006/main" xmlns:r="http://schemas.openxmlformats.org/officeDocument/2006/relationships" xmlns:p="http://schemas.openxmlformats.org/presentationml/2006/main">
+  <p:cSld>
+    <p:bg>
+      <p:bgRef idx="1001">
+        <a:schemeClr val="bg1"/>
+      </p:bgRef>
+    </p:bg>
+    <p:spTree>
+      <p:nvGrpSpPr>
+        <p:cNvPr id="1" name=""/>
+        <p:cNvGrpSpPr/>
+        <p:nvPr/>
+      </p:nvGrpSpPr>
+      <p:grpSpPr>
+        <a:xfrm>
+          <a:off x="0" y="0"/>
+          <a:ext cx="0" cy="0"/>
+          <a:chOff x="0" y="0"/>
+          <a:chExt cx="0" cy="0"/>
+        </a:xfrm>
+      </p:grpSpPr>
+      <p:sp>
+        <p:nvSpPr>
+          <p:cNvPr id="2" name="Header Placeholder 1"/>
+          <p:cNvSpPr>
+            <a:spLocks noGrp="1"/>
+          </p:cNvSpPr>
+          <p:nvPr>
+            <p:ph type="hdr" sz="quarter"/>
+          </p:nvPr>
+        </p:nvSpPr>
+        <p:spPr>
+          <a:xfrm>
+            <a:off x="0" y="0"/>
+            <a:ext cx="2971800" cy="458788"/>
+          </a:xfrm>
+          <a:prstGeom prst="rect">
+            <a:avLst/>
+          </a:prstGeom>
+        </p:spPr>
+        <p:txBody>
+          <a:bodyPr vert="horz" lIns="91440" tIns="45720" rIns="91440" bIns="45720" rtlCol="0"/>
+          <a:lstStyle>
+            <a:lvl1pPr algn="l">
+              <a:defRPr sz="1200"/>
+            </a:lvl1pPr>
+          </a:lstStyle>
+          <a:p>
+            <a:endParaRPr lang="en-GB"/>
+          </a:p>
+        </p:txBody>
+      </p:sp>
+      <p:sp>
+        <p:nvSpPr>
+          <p:cNvPr id="3" name="Date Placeholder 2"/>
+          <p:cNvSpPr>
+            <a:spLocks noGrp="1"/>
+          </p:cNvSpPr>
+          <p:nvPr>
+            <p:ph type="dt" idx="1"/>
+          </p:nvPr>
+        </p:nvSpPr>
+        <p:spPr>
+          <a:xfrm>
+            <a:off x="3884613" y="0"/>
+            <a:ext cx="2971800" cy="458788"/>
+          </a:xfrm>
+          <a:prstGeom prst="rect">
+            <a:avLst/>
+          </a:prstGeom>
+        </p:spPr>
+        <p:txBody>
+          <a:bodyPr vert="horz" lIns="91440" tIns="45720" rIns="91440" bIns="45720" rtlCol="0"/>
+          <a:lstStyle>
+            <a:lvl1pPr algn="r">
+              <a:defRPr sz="1200"/>
+            </a:lvl1pPr>
+          </a:lstStyle>
+          <a:p>
+            <a:fld id="{B7843E09-34A7-4F8F-99CB-500840D59E4D}" type="datetimeFigureOut">
+              <a:rPr lang="en-GB" smtClean="0"/>
+              <a:t>23/11/2020</a:t>
+            </a:fld>
+            <a:endParaRPr lang="en-GB"/>
+          </a:p>
+        </p:txBody>
+      </p:sp>
+      <p:sp>
+        <p:nvSpPr>
+          <p:cNvPr id="4" name="Slide Image Placeholder 3"/>
+          <p:cNvSpPr>
+            <a:spLocks noGrp="1" noRot="1" noChangeAspect="1"/>
+          </p:cNvSpPr>
+          <p:nvPr>
+            <p:ph type="sldImg" idx="2"/>
+          </p:nvPr>
+        </p:nvSpPr>
+        <p:spPr>
+          <a:xfrm>
+            <a:off x="685800" y="1143000"/>
+            <a:ext cx="5486400" cy="3086100"/>
+          </a:xfrm>
+          <a:prstGeom prst="rect">
+            <a:avLst/>
+          </a:prstGeom>
+          <a:noFill/>
+          <a:ln w="12700">
+            <a:solidFill>
+              <a:prstClr val="black"/>
+            </a:solidFill>
+          </a:ln>
+        </p:spPr>
+        <p:txBody>
+          <a:bodyPr vert="horz" lIns="91440" tIns="45720" rIns="91440" bIns="45720" rtlCol="0" anchor="ctr"/>
+          <a:lstStyle/>
+          <a:p>
+            <a:endParaRPr lang="en-GB"/>
+          </a:p>
+        </p:txBody>
+      </p:sp>
+      <p:sp>
+        <p:nvSpPr>
+          <p:cNvPr id="5" name="Notes Placeholder 4"/>
+          <p:cNvSpPr>
+            <a:spLocks noGrp="1"/>
+          </p:cNvSpPr>
+          <p:nvPr>
+            <p:ph type="body" sz="quarter" idx="3"/>
+          </p:nvPr>
+        </p:nvSpPr>
+        <p:spPr>
+          <a:xfrm>
+            <a:off x="685800" y="4400550"/>
+            <a:ext cx="5486400" cy="3600450"/>
+          </a:xfrm>
+          <a:prstGeom prst="rect">
+            <a:avLst/>
+          </a:prstGeom>
+        </p:spPr>
+        <p:txBody>
+          <a:bodyPr vert="horz" lIns="91440" tIns="45720" rIns="91440" bIns="45720" rtlCol="0"/>
+          <a:lstStyle/>
+          <a:p>
+            <a:pPr lvl="0"/>
+            <a:r>
+              <a:rPr lang="en-US"/>
+              <a:t>Click to edit Master text styles</a:t>
+            </a:r>
+          </a:p>
+          <a:p>
+            <a:pPr lvl="1"/>
+            <a:r>
+              <a:rPr lang="en-US"/>
+              <a:t>Second level</a:t>
+            </a:r>
+          </a:p>
+          <a:p>
+            <a:pPr lvl="2"/>
+            <a:r>
+              <a:rPr lang="en-US"/>
+              <a:t>Third level</a:t>
+            </a:r>
+          </a:p>
+          <a:p>
+            <a:pPr lvl="3"/>
+            <a:r>
+              <a:rPr lang="en-US"/>
+              <a:t>Fourth level</a:t>
+            </a:r>
+          </a:p>
+          <a:p>
+            <a:pPr lvl="4"/>
+            <a:r>
+              <a:rPr lang="en-US"/>
+              <a:t>Fifth level</a:t>
+            </a:r>
+            <a:endParaRPr lang="en-GB"/>
+          </a:p>
+        </p:txBody>
+      </p:sp>
+      <p:sp>
+        <p:nvSpPr>
+          <p:cNvPr id="6" name="Footer Placeholder 5"/>
+          <p:cNvSpPr>
+            <a:spLocks noGrp="1"/>
+          </p:cNvSpPr>
+          <p:nvPr>
+            <p:ph type="ftr" sz="quarter" idx="4"/>
+          </p:nvPr>
+        </p:nvSpPr>
+        <p:spPr>
+          <a:xfrm>
+            <a:off x="0" y="8685213"/>
+            <a:ext cx="2971800" cy="458787"/>
+          </a:xfrm>
+          <a:prstGeom prst="rect">
+            <a:avLst/>
+          </a:prstGeom>
+        </p:spPr>
+        <p:txBody>
+          <a:bodyPr vert="horz" lIns="91440" tIns="45720" rIns="91440" bIns="45720" rtlCol="0" anchor="b"/>
+          <a:lstStyle>
+            <a:lvl1pPr algn="l">
+              <a:defRPr sz="1200"/>
+            </a:lvl1pPr>
+          </a:lstStyle>
+          <a:p>
+            <a:endParaRPr lang="en-GB"/>
+          </a:p>
+        </p:txBody>
+      </p:sp>
+      <p:sp>
+        <p:nvSpPr>
+          <p:cNvPr id="7" name="Slide Number Placeholder 6"/>
+          <p:cNvSpPr>
+            <a:spLocks noGrp="1"/>
+          </p:cNvSpPr>
+          <p:nvPr>
+            <p:ph type="sldNum" sz="quarter" idx="5"/>
+          </p:nvPr>
+        </p:nvSpPr>
+        <p:spPr>
+          <a:xfrm>
+            <a:off x="3884613" y="8685213"/>
+            <a:ext cx="2971800" cy="458787"/>
+          </a:xfrm>
+          <a:prstGeom prst="rect">
+            <a:avLst/>
+          </a:prstGeom>
+        </p:spPr>
+        <p:txBody>
+          <a:bodyPr vert="horz" lIns="91440" tIns="45720" rIns="91440" bIns="45720" rtlCol="0" anchor="b"/>
+          <a:lstStyle>
+            <a:lvl1pPr algn="r">
+              <a:defRPr sz="1200"/>
+            </a:lvl1pPr>
+          </a:lstStyle>
+          <a:p>
+            <a:fld id="{41A9E844-0DEF-4027-B5EF-FD55092901FA}" type="slidenum">
+              <a:rPr lang="en-GB" smtClean="0"/>
+              <a:t>‹#›</a:t>
+            </a:fld>
+            <a:endParaRPr lang="en-GB"/>
+          </a:p>
+        </p:txBody>
+      </p:sp>
+    </p:spTree>
+    <p:extLst>
+      <p:ext uri="{BB962C8B-B14F-4D97-AF65-F5344CB8AC3E}">
+        <p14:creationId xmlns:p14="http://schemas.microsoft.com/office/powerpoint/2010/main" val="213670744"/>
+      </p:ext>
+    </p:extLst>
+  </p:cSld>
+  <p:clrMap bg1="lt1" tx1="dk1" bg2="lt2" tx2="dk2" accent1="accent1" accent2="accent2" accent3="accent3" accent4="accent4" accent5="accent5" accent6="accent6" hlink="hlink" folHlink="folHlink"/>
+  <p:notesStyle>
+    <a:lvl1pPr marL="0" algn="l" defTabSz="914400" rtl="0" eaLnBrk="1" latinLnBrk="0" hangingPunct="1">
+      <a:defRPr sz="1200" kern="1200">
+        <a:solidFill>
+          <a:schemeClr val="tx1"/>
+        </a:solidFill>
+        <a:latin typeface="+mn-lt"/>
+        <a:ea typeface="+mn-ea"/>
+        <a:cs typeface="+mn-cs"/>
+      </a:defRPr>
+    </a:lvl1pPr>
+    <a:lvl2pPr marL="457200" algn="l" defTabSz="914400" rtl="0" eaLnBrk="1" latinLnBrk="0" hangingPunct="1">
+      <a:defRPr sz="1200" kern="1200">
+        <a:solidFill>
+          <a:schemeClr val="tx1"/>
+        </a:solidFill>
+        <a:latin typeface="+mn-lt"/>
+        <a:ea typeface="+mn-ea"/>
+        <a:cs typeface="+mn-cs"/>
+      </a:defRPr>
+    </a:lvl2pPr>
+    <a:lvl3pPr marL="914400" algn="l" defTabSz="914400" rtl="0" eaLnBrk="1" latinLnBrk="0" hangingPunct="1">
+      <a:defRPr sz="1200" kern="1200">
+        <a:solidFill>
+          <a:schemeClr val="tx1"/>
+        </a:solidFill>
+        <a:latin typeface="+mn-lt"/>
+        <a:ea typeface="+mn-ea"/>
+        <a:cs typeface="+mn-cs"/>
+      </a:defRPr>
+    </a:lvl3pPr>
+    <a:lvl4pPr marL="1371600" algn="l" defTabSz="914400" rtl="0" eaLnBrk="1" latinLnBrk="0" hangingPunct="1">
+      <a:defRPr sz="1200" kern="1200">
+        <a:solidFill>
+          <a:schemeClr val="tx1"/>
+        </a:solidFill>
+        <a:latin typeface="+mn-lt"/>
+        <a:ea typeface="+mn-ea"/>
+        <a:cs typeface="+mn-cs"/>
+      </a:defRPr>
+    </a:lvl4pPr>
+    <a:lvl5pPr marL="1828800" algn="l" defTabSz="914400" rtl="0" eaLnBrk="1" latinLnBrk="0" hangingPunct="1">
+      <a:defRPr sz="1200" kern="1200">
+        <a:solidFill>
+          <a:schemeClr val="tx1"/>
+        </a:solidFill>
+        <a:latin typeface="+mn-lt"/>
+        <a:ea typeface="+mn-ea"/>
+        <a:cs typeface="+mn-cs"/>
+      </a:defRPr>
+    </a:lvl5pPr>
+    <a:lvl6pPr marL="2286000" algn="l" defTabSz="914400" rtl="0" eaLnBrk="1" latinLnBrk="0" hangingPunct="1">
+      <a:defRPr sz="1200" kern="1200">
+        <a:solidFill>
+          <a:schemeClr val="tx1"/>
+        </a:solidFill>
+        <a:latin typeface="+mn-lt"/>
+        <a:ea typeface="+mn-ea"/>
+        <a:cs typeface="+mn-cs"/>
+      </a:defRPr>
+    </a:lvl6pPr>
+    <a:lvl7pPr marL="2743200" algn="l" defTabSz="914400" rtl="0" eaLnBrk="1" latinLnBrk="0" hangingPunct="1">
+      <a:defRPr sz="1200" kern="1200">
+        <a:solidFill>
+          <a:schemeClr val="tx1"/>
+        </a:solidFill>
+        <a:latin typeface="+mn-lt"/>
+        <a:ea typeface="+mn-ea"/>
+        <a:cs typeface="+mn-cs"/>
+      </a:defRPr>
+    </a:lvl7pPr>
+    <a:lvl8pPr marL="3200400" algn="l" defTabSz="914400" rtl="0" eaLnBrk="1" latinLnBrk="0" hangingPunct="1">
+      <a:defRPr sz="1200" kern="1200">
+        <a:solidFill>
+          <a:schemeClr val="tx1"/>
+        </a:solidFill>
+        <a:latin typeface="+mn-lt"/>
+        <a:ea typeface="+mn-ea"/>
+        <a:cs typeface="+mn-cs"/>
+      </a:defRPr>
+    </a:lvl8pPr>
+    <a:lvl9pPr marL="3657600" algn="l" defTabSz="914400" rtl="0" eaLnBrk="1" latinLnBrk="0" hangingPunct="1">
+      <a:defRPr sz="1200" kern="1200">
+        <a:solidFill>
+          <a:schemeClr val="tx1"/>
+        </a:solidFill>
+        <a:latin typeface="+mn-lt"/>
+        <a:ea typeface="+mn-ea"/>
+        <a:cs typeface="+mn-cs"/>
+      </a:defRPr>
+    </a:lvl9pPr>
+  </p:notesStyle>
+</p:notesMaster>
+</file>
+
+<file path=ppt/notesSlides/notesSlide1.xml><?xml version="1.0" encoding="utf-8"?>
+<p:notes xmlns:a="http://schemas.openxmlformats.org/drawingml/2006/main" xmlns:r="http://schemas.openxmlformats.org/officeDocument/2006/relationships" xmlns:p="http://schemas.openxmlformats.org/presentationml/2006/main">
+  <p:cSld>
+    <p:spTree>
+      <p:nvGrpSpPr>
+        <p:cNvPr id="1" name=""/>
+        <p:cNvGrpSpPr/>
+        <p:nvPr/>
+      </p:nvGrpSpPr>
+      <p:grpSpPr>
+        <a:xfrm>
+          <a:off x="0" y="0"/>
+          <a:ext cx="0" cy="0"/>
+          <a:chOff x="0" y="0"/>
+          <a:chExt cx="0" cy="0"/>
+        </a:xfrm>
+      </p:grpSpPr>
+      <p:sp>
+        <p:nvSpPr>
+          <p:cNvPr id="2" name="Slide Image Placeholder 1"/>
+          <p:cNvSpPr>
+            <a:spLocks noGrp="1" noRot="1" noChangeAspect="1"/>
+          </p:cNvSpPr>
+          <p:nvPr>
+            <p:ph type="sldImg"/>
+          </p:nvPr>
+        </p:nvSpPr>
+        <p:spPr/>
+      </p:sp>
+      <p:sp>
+        <p:nvSpPr>
+          <p:cNvPr id="3" name="Notes Placeholder 2"/>
+          <p:cNvSpPr>
+            <a:spLocks noGrp="1"/>
+          </p:cNvSpPr>
+          <p:nvPr>
+            <p:ph type="body" idx="1"/>
+          </p:nvPr>
+        </p:nvSpPr>
+        <p:spPr/>
+        <p:txBody>
+          <a:bodyPr/>
+          <a:lstStyle/>
+          <a:p>
+            <a:endParaRPr lang="en-GB"/>
+          </a:p>
+        </p:txBody>
+      </p:sp>
+      <p:sp>
+        <p:nvSpPr>
+          <p:cNvPr id="4" name="Slide Number Placeholder 3"/>
+          <p:cNvSpPr>
+            <a:spLocks noGrp="1"/>
+          </p:cNvSpPr>
+          <p:nvPr>
+            <p:ph type="sldNum" sz="quarter" idx="5"/>
+          </p:nvPr>
+        </p:nvSpPr>
+        <p:spPr/>
+        <p:txBody>
+          <a:bodyPr/>
+          <a:lstStyle/>
+          <a:p>
+            <a:fld id="{41A9E844-0DEF-4027-B5EF-FD55092901FA}" type="slidenum">
+              <a:rPr lang="en-GB" smtClean="0"/>
+              <a:t>1</a:t>
+            </a:fld>
+            <a:endParaRPr lang="en-GB"/>
+          </a:p>
+        </p:txBody>
+      </p:sp>
+    </p:spTree>
+    <p:extLst>
+      <p:ext uri="{BB962C8B-B14F-4D97-AF65-F5344CB8AC3E}">
+        <p14:creationId xmlns:p14="http://schemas.microsoft.com/office/powerpoint/2010/main" val="162254918"/>
+      </p:ext>
+    </p:extLst>
+  </p:cSld>
+  <p:clrMapOvr>
+    <a:masterClrMapping/>
+  </p:clrMapOvr>
+</p:notes>
+</file>
+
 <file path=ppt/slideLayouts/slideLayout1.xml><?xml version="1.0" encoding="utf-8"?>
 <p:sldLayout xmlns:a="http://schemas.openxmlformats.org/drawingml/2006/main" xmlns:r="http://schemas.openxmlformats.org/officeDocument/2006/relationships" xmlns:p="http://schemas.openxmlformats.org/presentationml/2006/main" type="title" preserve="1">
   <p:cSld name="Title Slide">
@@ -5857,7 +6731,7 @@
           <a:p>
             <a:fld id="{B60AB0CC-5388-4A1D-9FE8-C6D505659423}" type="datetimeFigureOut">
               <a:rPr lang="en-GB" smtClean="0"/>
-              <a:t>26/10/2020</a:t>
+              <a:t>23/11/2020</a:t>
             </a:fld>
             <a:endParaRPr lang="en-GB"/>
           </a:p>
@@ -6057,7 +6931,7 @@
           <a:p>
             <a:fld id="{B60AB0CC-5388-4A1D-9FE8-C6D505659423}" type="datetimeFigureOut">
               <a:rPr lang="en-GB" smtClean="0"/>
-              <a:t>26/10/2020</a:t>
+              <a:t>23/11/2020</a:t>
             </a:fld>
             <a:endParaRPr lang="en-GB"/>
           </a:p>
@@ -6267,7 +7141,7 @@
           <a:p>
             <a:fld id="{B60AB0CC-5388-4A1D-9FE8-C6D505659423}" type="datetimeFigureOut">
               <a:rPr lang="en-GB" smtClean="0"/>
-              <a:t>26/10/2020</a:t>
+              <a:t>23/11/2020</a:t>
             </a:fld>
             <a:endParaRPr lang="en-GB"/>
           </a:p>
@@ -6467,7 +7341,7 @@
           <a:p>
             <a:fld id="{B60AB0CC-5388-4A1D-9FE8-C6D505659423}" type="datetimeFigureOut">
               <a:rPr lang="en-GB" smtClean="0"/>
-              <a:t>26/10/2020</a:t>
+              <a:t>23/11/2020</a:t>
             </a:fld>
             <a:endParaRPr lang="en-GB"/>
           </a:p>
@@ -6743,7 +7617,7 @@
           <a:p>
             <a:fld id="{B60AB0CC-5388-4A1D-9FE8-C6D505659423}" type="datetimeFigureOut">
               <a:rPr lang="en-GB" smtClean="0"/>
-              <a:t>26/10/2020</a:t>
+              <a:t>23/11/2020</a:t>
             </a:fld>
             <a:endParaRPr lang="en-GB"/>
           </a:p>
@@ -7011,7 +7885,7 @@
           <a:p>
             <a:fld id="{B60AB0CC-5388-4A1D-9FE8-C6D505659423}" type="datetimeFigureOut">
               <a:rPr lang="en-GB" smtClean="0"/>
-              <a:t>26/10/2020</a:t>
+              <a:t>23/11/2020</a:t>
             </a:fld>
             <a:endParaRPr lang="en-GB"/>
           </a:p>
@@ -7426,7 +8300,7 @@
           <a:p>
             <a:fld id="{B60AB0CC-5388-4A1D-9FE8-C6D505659423}" type="datetimeFigureOut">
               <a:rPr lang="en-GB" smtClean="0"/>
-              <a:t>26/10/2020</a:t>
+              <a:t>23/11/2020</a:t>
             </a:fld>
             <a:endParaRPr lang="en-GB"/>
           </a:p>
@@ -7568,7 +8442,7 @@
           <a:p>
             <a:fld id="{B60AB0CC-5388-4A1D-9FE8-C6D505659423}" type="datetimeFigureOut">
               <a:rPr lang="en-GB" smtClean="0"/>
-              <a:t>26/10/2020</a:t>
+              <a:t>23/11/2020</a:t>
             </a:fld>
             <a:endParaRPr lang="en-GB"/>
           </a:p>
@@ -7681,7 +8555,7 @@
           <a:p>
             <a:fld id="{B60AB0CC-5388-4A1D-9FE8-C6D505659423}" type="datetimeFigureOut">
               <a:rPr lang="en-GB" smtClean="0"/>
-              <a:t>26/10/2020</a:t>
+              <a:t>23/11/2020</a:t>
             </a:fld>
             <a:endParaRPr lang="en-GB"/>
           </a:p>
@@ -7994,7 +8868,7 @@
           <a:p>
             <a:fld id="{B60AB0CC-5388-4A1D-9FE8-C6D505659423}" type="datetimeFigureOut">
               <a:rPr lang="en-GB" smtClean="0"/>
-              <a:t>26/10/2020</a:t>
+              <a:t>23/11/2020</a:t>
             </a:fld>
             <a:endParaRPr lang="en-GB"/>
           </a:p>
@@ -8283,7 +9157,7 @@
           <a:p>
             <a:fld id="{B60AB0CC-5388-4A1D-9FE8-C6D505659423}" type="datetimeFigureOut">
               <a:rPr lang="en-GB" smtClean="0"/>
-              <a:t>26/10/2020</a:t>
+              <a:t>23/11/2020</a:t>
             </a:fld>
             <a:endParaRPr lang="en-GB"/>
           </a:p>
@@ -8526,7 +9400,7 @@
           <a:p>
             <a:fld id="{B60AB0CC-5388-4A1D-9FE8-C6D505659423}" type="datetimeFigureOut">
               <a:rPr lang="en-GB" smtClean="0"/>
-              <a:t>26/10/2020</a:t>
+              <a:t>23/11/2020</a:t>
             </a:fld>
             <a:endParaRPr lang="en-GB"/>
           </a:p>
@@ -8956,7 +9830,7 @@
           <p:nvPr>
             <p:extLst>
               <p:ext uri="{D42A27DB-BD31-4B8C-83A1-F6EECF244321}">
-                <p14:modId xmlns:p14="http://schemas.microsoft.com/office/powerpoint/2010/main" val="2582724481"/>
+                <p14:modId xmlns:p14="http://schemas.microsoft.com/office/powerpoint/2010/main" val="466725341"/>
               </p:ext>
             </p:extLst>
           </p:nvPr>
@@ -8967,7 +9841,7 @@
         </p:xfrm>
         <a:graphic>
           <a:graphicData uri="http://schemas.openxmlformats.org/drawingml/2006/diagram">
-            <dgm:relIds xmlns:dgm="http://schemas.openxmlformats.org/drawingml/2006/diagram" xmlns:r="http://schemas.openxmlformats.org/officeDocument/2006/relationships" r:dm="rId2" r:lo="rId3" r:qs="rId4" r:cs="rId5"/>
+            <dgm:relIds xmlns:dgm="http://schemas.openxmlformats.org/drawingml/2006/diagram" xmlns:r="http://schemas.openxmlformats.org/officeDocument/2006/relationships" r:dm="rId3" r:lo="rId4" r:qs="rId5" r:cs="rId6"/>
           </a:graphicData>
         </a:graphic>
       </p:graphicFrame>
@@ -9277,4 +10151,299 @@
     </a:ext>
   </a:extLst>
 </a:theme>
+</file>
+
+<file path=ppt/theme/theme2.xml><?xml version="1.0" encoding="utf-8"?>
+<a:theme xmlns:a="http://schemas.openxmlformats.org/drawingml/2006/main" name="Office Theme">
+  <a:themeElements>
+    <a:clrScheme name="Office">
+      <a:dk1>
+        <a:sysClr val="windowText" lastClr="000000"/>
+      </a:dk1>
+      <a:lt1>
+        <a:sysClr val="window" lastClr="FFFFFF"/>
+      </a:lt1>
+      <a:dk2>
+        <a:srgbClr val="44546A"/>
+      </a:dk2>
+      <a:lt2>
+        <a:srgbClr val="E7E6E6"/>
+      </a:lt2>
+      <a:accent1>
+        <a:srgbClr val="4472C4"/>
+      </a:accent1>
+      <a:accent2>
+        <a:srgbClr val="ED7D31"/>
+      </a:accent2>
+      <a:accent3>
+        <a:srgbClr val="A5A5A5"/>
+      </a:accent3>
+      <a:accent4>
+        <a:srgbClr val="FFC000"/>
+      </a:accent4>
+      <a:accent5>
+        <a:srgbClr val="5B9BD5"/>
+      </a:accent5>
+      <a:accent6>
+        <a:srgbClr val="70AD47"/>
+      </a:accent6>
+      <a:hlink>
+        <a:srgbClr val="0563C1"/>
+      </a:hlink>
+      <a:folHlink>
+        <a:srgbClr val="954F72"/>
+      </a:folHlink>
+    </a:clrScheme>
+    <a:fontScheme name="Office">
+      <a:majorFont>
+        <a:latin typeface="Calibri Light" panose="020F0302020204030204"/>
+        <a:ea typeface=""/>
+        <a:cs typeface=""/>
+        <a:font script="Jpan" typeface="游ゴシック Light"/>
+        <a:font script="Hang" typeface="맑은 고딕"/>
+        <a:font script="Hans" typeface="等线 Light"/>
+        <a:font script="Hant" typeface="新細明體"/>
+        <a:font script="Arab" typeface="Times New Roman"/>
+        <a:font script="Hebr" typeface="Times New Roman"/>
+        <a:font script="Thai" typeface="Angsana New"/>
+        <a:font script="Ethi" typeface="Nyala"/>
+        <a:font script="Beng" typeface="Vrinda"/>
+        <a:font script="Gujr" typeface="Shruti"/>
+        <a:font script="Khmr" typeface="MoolBoran"/>
+        <a:font script="Knda" typeface="Tunga"/>
+        <a:font script="Guru" typeface="Raavi"/>
+        <a:font script="Cans" typeface="Euphemia"/>
+        <a:font script="Cher" typeface="Plantagenet Cherokee"/>
+        <a:font script="Yiii" typeface="Microsoft Yi Baiti"/>
+        <a:font script="Tibt" typeface="Microsoft Himalaya"/>
+        <a:font script="Thaa" typeface="MV Boli"/>
+        <a:font script="Deva" typeface="Mangal"/>
+        <a:font script="Telu" typeface="Gautami"/>
+        <a:font script="Taml" typeface="Latha"/>
+        <a:font script="Syrc" typeface="Estrangelo Edessa"/>
+        <a:font script="Orya" typeface="Kalinga"/>
+        <a:font script="Mlym" typeface="Kartika"/>
+        <a:font script="Laoo" typeface="DokChampa"/>
+        <a:font script="Sinh" typeface="Iskoola Pota"/>
+        <a:font script="Mong" typeface="Mongolian Baiti"/>
+        <a:font script="Viet" typeface="Times New Roman"/>
+        <a:font script="Uigh" typeface="Microsoft Uighur"/>
+        <a:font script="Geor" typeface="Sylfaen"/>
+        <a:font script="Armn" typeface="Arial"/>
+        <a:font script="Bugi" typeface="Leelawadee UI"/>
+        <a:font script="Bopo" typeface="Microsoft JhengHei"/>
+        <a:font script="Java" typeface="Javanese Text"/>
+        <a:font script="Lisu" typeface="Segoe UI"/>
+        <a:font script="Mymr" typeface="Myanmar Text"/>
+        <a:font script="Nkoo" typeface="Ebrima"/>
+        <a:font script="Olck" typeface="Nirmala UI"/>
+        <a:font script="Osma" typeface="Ebrima"/>
+        <a:font script="Phag" typeface="Phagspa"/>
+        <a:font script="Syrn" typeface="Estrangelo Edessa"/>
+        <a:font script="Syrj" typeface="Estrangelo Edessa"/>
+        <a:font script="Syre" typeface="Estrangelo Edessa"/>
+        <a:font script="Sora" typeface="Nirmala UI"/>
+        <a:font script="Tale" typeface="Microsoft Tai Le"/>
+        <a:font script="Talu" typeface="Microsoft New Tai Lue"/>
+        <a:font script="Tfng" typeface="Ebrima"/>
+      </a:majorFont>
+      <a:minorFont>
+        <a:latin typeface="Calibri" panose="020F0502020204030204"/>
+        <a:ea typeface=""/>
+        <a:cs typeface=""/>
+        <a:font script="Jpan" typeface="游ゴシック"/>
+        <a:font script="Hang" typeface="맑은 고딕"/>
+        <a:font script="Hans" typeface="等线"/>
+        <a:font script="Hant" typeface="新細明體"/>
+        <a:font script="Arab" typeface="Arial"/>
+        <a:font script="Hebr" typeface="Arial"/>
+        <a:font script="Thai" typeface="Cordia New"/>
+        <a:font script="Ethi" typeface="Nyala"/>
+        <a:font script="Beng" typeface="Vrinda"/>
+        <a:font script="Gujr" typeface="Shruti"/>
+        <a:font script="Khmr" typeface="DaunPenh"/>
+        <a:font script="Knda" typeface="Tunga"/>
+        <a:font script="Guru" typeface="Raavi"/>
+        <a:font script="Cans" typeface="Euphemia"/>
+        <a:font script="Cher" typeface="Plantagenet Cherokee"/>
+        <a:font script="Yiii" typeface="Microsoft Yi Baiti"/>
+        <a:font script="Tibt" typeface="Microsoft Himalaya"/>
+        <a:font script="Thaa" typeface="MV Boli"/>
+        <a:font script="Deva" typeface="Mangal"/>
+        <a:font script="Telu" typeface="Gautami"/>
+        <a:font script="Taml" typeface="Latha"/>
+        <a:font script="Syrc" typeface="Estrangelo Edessa"/>
+        <a:font script="Orya" typeface="Kalinga"/>
+        <a:font script="Mlym" typeface="Kartika"/>
+        <a:font script="Laoo" typeface="DokChampa"/>
+        <a:font script="Sinh" typeface="Iskoola Pota"/>
+        <a:font script="Mong" typeface="Mongolian Baiti"/>
+        <a:font script="Viet" typeface="Arial"/>
+        <a:font script="Uigh" typeface="Microsoft Uighur"/>
+        <a:font script="Geor" typeface="Sylfaen"/>
+        <a:font script="Armn" typeface="Arial"/>
+        <a:font script="Bugi" typeface="Leelawadee UI"/>
+        <a:font script="Bopo" typeface="Microsoft JhengHei"/>
+        <a:font script="Java" typeface="Javanese Text"/>
+        <a:font script="Lisu" typeface="Segoe UI"/>
+        <a:font script="Mymr" typeface="Myanmar Text"/>
+        <a:font script="Nkoo" typeface="Ebrima"/>
+        <a:font script="Olck" typeface="Nirmala UI"/>
+        <a:font script="Osma" typeface="Ebrima"/>
+        <a:font script="Phag" typeface="Phagspa"/>
+        <a:font script="Syrn" typeface="Estrangelo Edessa"/>
+        <a:font script="Syrj" typeface="Estrangelo Edessa"/>
+        <a:font script="Syre" typeface="Estrangelo Edessa"/>
+        <a:font script="Sora" typeface="Nirmala UI"/>
+        <a:font script="Tale" typeface="Microsoft Tai Le"/>
+        <a:font script="Talu" typeface="Microsoft New Tai Lue"/>
+        <a:font script="Tfng" typeface="Ebrima"/>
+      </a:minorFont>
+    </a:fontScheme>
+    <a:fmtScheme name="Office">
+      <a:fillStyleLst>
+        <a:solidFill>
+          <a:schemeClr val="phClr"/>
+        </a:solidFill>
+        <a:gradFill rotWithShape="1">
+          <a:gsLst>
+            <a:gs pos="0">
+              <a:schemeClr val="phClr">
+                <a:lumMod val="110000"/>
+                <a:satMod val="105000"/>
+                <a:tint val="67000"/>
+              </a:schemeClr>
+            </a:gs>
+            <a:gs pos="50000">
+              <a:schemeClr val="phClr">
+                <a:lumMod val="105000"/>
+                <a:satMod val="103000"/>
+                <a:tint val="73000"/>
+              </a:schemeClr>
+            </a:gs>
+            <a:gs pos="100000">
+              <a:schemeClr val="phClr">
+                <a:lumMod val="105000"/>
+                <a:satMod val="109000"/>
+                <a:tint val="81000"/>
+              </a:schemeClr>
+            </a:gs>
+          </a:gsLst>
+          <a:lin ang="5400000" scaled="0"/>
+        </a:gradFill>
+        <a:gradFill rotWithShape="1">
+          <a:gsLst>
+            <a:gs pos="0">
+              <a:schemeClr val="phClr">
+                <a:satMod val="103000"/>
+                <a:lumMod val="102000"/>
+                <a:tint val="94000"/>
+              </a:schemeClr>
+            </a:gs>
+            <a:gs pos="50000">
+              <a:schemeClr val="phClr">
+                <a:satMod val="110000"/>
+                <a:lumMod val="100000"/>
+                <a:shade val="100000"/>
+              </a:schemeClr>
+            </a:gs>
+            <a:gs pos="100000">
+              <a:schemeClr val="phClr">
+                <a:lumMod val="99000"/>
+                <a:satMod val="120000"/>
+                <a:shade val="78000"/>
+              </a:schemeClr>
+            </a:gs>
+          </a:gsLst>
+          <a:lin ang="5400000" scaled="0"/>
+        </a:gradFill>
+      </a:fillStyleLst>
+      <a:lnStyleLst>
+        <a:ln w="6350" cap="flat" cmpd="sng" algn="ctr">
+          <a:solidFill>
+            <a:schemeClr val="phClr"/>
+          </a:solidFill>
+          <a:prstDash val="solid"/>
+          <a:miter lim="800000"/>
+        </a:ln>
+        <a:ln w="12700" cap="flat" cmpd="sng" algn="ctr">
+          <a:solidFill>
+            <a:schemeClr val="phClr"/>
+          </a:solidFill>
+          <a:prstDash val="solid"/>
+          <a:miter lim="800000"/>
+        </a:ln>
+        <a:ln w="19050" cap="flat" cmpd="sng" algn="ctr">
+          <a:solidFill>
+            <a:schemeClr val="phClr"/>
+          </a:solidFill>
+          <a:prstDash val="solid"/>
+          <a:miter lim="800000"/>
+        </a:ln>
+      </a:lnStyleLst>
+      <a:effectStyleLst>
+        <a:effectStyle>
+          <a:effectLst/>
+        </a:effectStyle>
+        <a:effectStyle>
+          <a:effectLst/>
+        </a:effectStyle>
+        <a:effectStyle>
+          <a:effectLst>
+            <a:outerShdw blurRad="57150" dist="19050" dir="5400000" algn="ctr" rotWithShape="0">
+              <a:srgbClr val="000000">
+                <a:alpha val="63000"/>
+              </a:srgbClr>
+            </a:outerShdw>
+          </a:effectLst>
+        </a:effectStyle>
+      </a:effectStyleLst>
+      <a:bgFillStyleLst>
+        <a:solidFill>
+          <a:schemeClr val="phClr"/>
+        </a:solidFill>
+        <a:solidFill>
+          <a:schemeClr val="phClr">
+            <a:tint val="95000"/>
+            <a:satMod val="170000"/>
+          </a:schemeClr>
+        </a:solidFill>
+        <a:gradFill rotWithShape="1">
+          <a:gsLst>
+            <a:gs pos="0">
+              <a:schemeClr val="phClr">
+                <a:tint val="93000"/>
+                <a:satMod val="150000"/>
+                <a:shade val="98000"/>
+                <a:lumMod val="102000"/>
+              </a:schemeClr>
+            </a:gs>
+            <a:gs pos="50000">
+              <a:schemeClr val="phClr">
+                <a:tint val="98000"/>
+                <a:satMod val="130000"/>
+                <a:shade val="90000"/>
+                <a:lumMod val="103000"/>
+              </a:schemeClr>
+            </a:gs>
+            <a:gs pos="100000">
+              <a:schemeClr val="phClr">
+                <a:shade val="63000"/>
+                <a:satMod val="120000"/>
+              </a:schemeClr>
+            </a:gs>
+          </a:gsLst>
+          <a:lin ang="5400000" scaled="0"/>
+        </a:gradFill>
+      </a:bgFillStyleLst>
+    </a:fmtScheme>
+  </a:themeElements>
+  <a:objectDefaults/>
+  <a:extraClrSchemeLst/>
+  <a:extLst>
+    <a:ext uri="{05A4C25C-085E-4340-85A3-A5531E510DB2}">
+      <thm15:themeFamily xmlns:thm15="http://schemas.microsoft.com/office/thememl/2012/main" name="Office Theme" id="{62F939B6-93AF-4DB8-9C6B-D6C7DFDC589F}" vid="{4A3C46E8-61CC-4603-A589-7422A47A8E4A}"/>
+    </a:ext>
+  </a:extLst>
+</a:theme>
 </file>
</xml_diff>